<commit_message>
Upload all the mini-presentations
</commit_message>
<xml_diff>
--- a/_PRESENTATIONS/VCH-Overview/Overview.pptx
+++ b/_PRESENTATIONS/VCH-Overview/Overview.pptx
@@ -5,7 +5,7 @@
     <p:sldMasterId id="2147483686" r:id="rId1"/>
   </p:sldMasterIdLst>
   <p:notesMasterIdLst>
-    <p:notesMasterId r:id="rId16"/>
+    <p:notesMasterId r:id="rId19"/>
   </p:notesMasterIdLst>
   <p:sldIdLst>
     <p:sldId id="256" r:id="rId2"/>
@@ -22,6 +22,9 @@
     <p:sldId id="267" r:id="rId13"/>
     <p:sldId id="268" r:id="rId14"/>
     <p:sldId id="269" r:id="rId15"/>
+    <p:sldId id="270" r:id="rId16"/>
+    <p:sldId id="271" r:id="rId17"/>
+    <p:sldId id="272" r:id="rId18"/>
   </p:sldIdLst>
   <p:sldSz cx="12192000" cy="6858000"/>
   <p:notesSz cx="6858000" cy="9144000"/>
@@ -537,7 +540,7 @@
             </a:pPr>
             <a:r>
               <a:rPr/>
-              <a:t>This project lays the technical foundation for responsible student-AI interaction. It reduces reliance on cloud services and enables advanced, privacy-safe research workflows. With a small investment, we can turn this into a standard part of classroom education.</a:t>
+              <a:t>From trial to traction: this project has turned lessons into systems, failures into frameworks, and ideas into infrastructure.</a:t>
             </a:r>
           </a:p>
         </p:txBody>
@@ -559,7 +562,7 @@
           <a:p>
             <a:fld id="{18BDFEC3-8487-43E8-A154-7C12CBC1FFF2}" type="slidenum">
               <a:rPr lang="en-US"/>
-              <a:t>5</a:t>
+              <a:t>2</a:t>
             </a:fld>
             <a:endParaRPr lang="en-US"/>
           </a:p>
@@ -619,7 +622,7 @@
             </a:pPr>
             <a:r>
               <a:rPr/>
-              <a:t>This setup is about lowering the threshold for student experimentation. We now have a local cloud, open AI tools, and a Linux-based desktop system under one roof. With testing and refinement, this becomes a plug-and-play environment for future student-driven supply chain solutions.</a:t>
+              <a:t>This slide shows that we’re not just planning — we’re actively building. Technical systems are running, educational content is being delivered, and external partnerships are forming. We’re laying the groundwork for scale, credibility, and cross-disciplinary impact.</a:t>
             </a:r>
           </a:p>
         </p:txBody>
@@ -641,7 +644,7 @@
           <a:p>
             <a:fld id="{18BDFEC3-8487-43E8-A154-7C12CBC1FFF2}" type="slidenum">
               <a:rPr lang="en-US"/>
-              <a:t>6</a:t>
+              <a:t>3</a:t>
             </a:fld>
             <a:endParaRPr lang="en-US"/>
           </a:p>
@@ -701,7 +704,7 @@
             </a:pPr>
             <a:r>
               <a:rPr/>
-              <a:t>This is about making research replicable, auditable, and extensible. With this setup, students and researchers can package their work in a form that others can immediately reuse or rerun. It’s a key step toward making our lab academically credible and open-source ready.</a:t>
+              <a:t>This project lays the technical foundation for responsible student-AI interaction. It reduces reliance on cloud services and enables advanced, privacy-safe research workflows. With a small investment, we can turn this into a standard part of classroom education.</a:t>
             </a:r>
           </a:p>
         </p:txBody>
@@ -723,7 +726,7 @@
           <a:p>
             <a:fld id="{18BDFEC3-8487-43E8-A154-7C12CBC1FFF2}" type="slidenum">
               <a:rPr lang="en-US"/>
-              <a:t>7</a:t>
+              <a:t>5</a:t>
             </a:fld>
             <a:endParaRPr lang="en-US"/>
           </a:p>
@@ -783,7 +786,7 @@
             </a:pPr>
             <a:r>
               <a:rPr/>
-              <a:t>This project is about critical thinking. We’re not selling AI — we’re building fluency in when and how to use it. These workshops teach students to confront the gap between theoretical AI performance and actual system behavior. That’s where deep learning happens — and where trust is earned.</a:t>
+              <a:t>This setup is about lowering the threshold for student experimentation. We now have a local cloud, open AI tools, and a Linux-based desktop system under one roof. With testing and refinement, this becomes a plug-and-play environment for future student-driven supply chain solutions.</a:t>
             </a:r>
           </a:p>
         </p:txBody>
@@ -805,7 +808,7 @@
           <a:p>
             <a:fld id="{18BDFEC3-8487-43E8-A154-7C12CBC1FFF2}" type="slidenum">
               <a:rPr lang="en-US"/>
-              <a:t>8</a:t>
+              <a:t>6</a:t>
             </a:fld>
             <a:endParaRPr lang="en-US"/>
           </a:p>
@@ -865,7 +868,7 @@
             </a:pPr>
             <a:r>
               <a:rPr/>
-              <a:t>This slide is a call to shift from theory to empowerment. Students thrive when given working tools and mentorship. The current model is burning energy on trying to teach what can’t be learned in a crash course. Instead, let’s supercharge them — and learn from what breaks.</a:t>
+              <a:t>This is about making research replicable, auditable, and extensible. With this setup, students and researchers can package their work in a form that others can immediately reuse or rerun. It’s a key step toward making our lab academically credible and open-source ready.</a:t>
             </a:r>
           </a:p>
         </p:txBody>
@@ -887,7 +890,7 @@
           <a:p>
             <a:fld id="{18BDFEC3-8487-43E8-A154-7C12CBC1FFF2}" type="slidenum">
               <a:rPr lang="en-US"/>
-              <a:t>9</a:t>
+              <a:t>7</a:t>
             </a:fld>
             <a:endParaRPr lang="en-US"/>
           </a:p>
@@ -947,7 +950,7 @@
             </a:pPr>
             <a:r>
               <a:rPr/>
-              <a:t>SupplyLens brings together sustainability, transparency, and AI to address a real need: supply chain visibility. After a difficult first iteration, this new approach is grounded, collaborative, and well-scoped. With a small budget and a bit of trust, we can show fast progress.</a:t>
+              <a:t>This initiative keeps us ahead of the curve in research tech. While not production-ready, these experimental tools offer a glimpse into how AI might eventually support fully automated or guided scientific inquiry. We should test now — and decide where to engage deeper.</a:t>
             </a:r>
           </a:p>
         </p:txBody>
@@ -969,7 +972,7 @@
           <a:p>
             <a:fld id="{18BDFEC3-8487-43E8-A154-7C12CBC1FFF2}" type="slidenum">
               <a:rPr lang="en-US"/>
-              <a:t>10</a:t>
+              <a:t>13</a:t>
             </a:fld>
             <a:endParaRPr lang="en-US"/>
           </a:p>
@@ -1029,7 +1032,7 @@
             </a:pPr>
             <a:r>
               <a:rPr/>
-              <a:t>This initiative keeps us ahead of the curve in research tech. While not production-ready, these experimental tools offer a glimpse into how AI might eventually support fully automated or guided scientific inquiry. We should test now — and decide where to engage deeper.</a:t>
+              <a:t>ClearRoots bridges regulatory pressure with practical tech. It empowers both sides of the supply chain with credible documentation — not token checklists. We’re ready to move, and we’re aligned with real partners. What we need now is momentum and backing.</a:t>
             </a:r>
           </a:p>
         </p:txBody>
@@ -1051,7 +1054,7 @@
           <a:p>
             <a:fld id="{18BDFEC3-8487-43E8-A154-7C12CBC1FFF2}" type="slidenum">
               <a:rPr lang="en-US"/>
-              <a:t>11</a:t>
+              <a:t>14</a:t>
             </a:fld>
             <a:endParaRPr lang="en-US"/>
           </a:p>
@@ -1111,7 +1114,7 @@
             </a:pPr>
             <a:r>
               <a:rPr/>
-              <a:t>ClearRoots bridges regulatory pressure with practical tech. It empowers both sides of the supply chain with credible documentation — not token checklists. We’re ready to move, and we’re aligned with real partners. What we need now is momentum and backing.</a:t>
+              <a:t>ClearPaper transforms legal ambiguity into usable tools. It empowers smallholders and de-risks compliance for importers. Without clear templates, compliance is guesswork. This project builds clarity, confidence</a:t>
             </a:r>
           </a:p>
         </p:txBody>
@@ -1133,7 +1136,7 @@
           <a:p>
             <a:fld id="{18BDFEC3-8487-43E8-A154-7C12CBC1FFF2}" type="slidenum">
               <a:rPr lang="en-US"/>
-              <a:t>12</a:t>
+              <a:t>15</a:t>
             </a:fld>
             <a:endParaRPr lang="en-US"/>
           </a:p>
@@ -1193,7 +1196,7 @@
             </a:pPr>
             <a:r>
               <a:rPr/>
-              <a:t>ClearPaper translates EU regulation into usable formats. It reduces ambiguity and levels the playing field. Without shared templates, even honest actors are at risk of non-compliance. This project builds trust into the documentation process.</a:t>
+              <a:t>Bi-Ronald offers a scalable solution for automating survey processes, providing immediate, personalized feedback to participants while maintaining data control and privacy.</a:t>
             </a:r>
           </a:p>
         </p:txBody>
@@ -1215,7 +1218,7 @@
           <a:p>
             <a:fld id="{18BDFEC3-8487-43E8-A154-7C12CBC1FFF2}" type="slidenum">
               <a:rPr lang="en-US"/>
-              <a:t>13</a:t>
+              <a:t>16</a:t>
             </a:fld>
             <a:endParaRPr lang="en-US"/>
           </a:p>
@@ -1276,7 +1279,7 @@
             <a:lvl1pPr algn="ctr">
               <a:defRPr sz="3600">
                 <a:solidFill>
-                  <a:srgbClr val="1A1A1A"/>
+                  <a:srgbClr val="FBD01E"/>
                 </a:solidFill>
               </a:defRPr>
             </a:lvl1pPr>
@@ -1321,7 +1324,7 @@
               <a:buNone/>
               <a:defRPr sz="1800" b="0">
                 <a:solidFill>
-                  <a:srgbClr val="DC322F"/>
+                  <a:srgbClr val="F4F7FC"/>
                 </a:solidFill>
               </a:defRPr>
             </a:lvl1pPr>
@@ -1519,7 +1522,7 @@
             <a:lvl1pPr>
               <a:defRPr>
                 <a:solidFill>
-                  <a:srgbClr val="DC322F"/>
+                  <a:srgbClr val="233A5B"/>
                 </a:solidFill>
               </a:defRPr>
             </a:lvl1pPr>
@@ -1743,7 +1746,7 @@
             <a:lvl1pPr>
               <a:defRPr>
                 <a:solidFill>
-                  <a:srgbClr val="1A1A1A"/>
+                  <a:srgbClr val="233A5B"/>
                 </a:solidFill>
               </a:defRPr>
             </a:lvl1pPr>
@@ -1781,7 +1784,43 @@
         </p:spPr>
         <p:txBody>
           <a:bodyPr vert="eaVert"/>
-          <a:lstStyle/>
+          <a:lstStyle>
+            <a:lvl1pPr>
+              <a:defRPr>
+                <a:solidFill>
+                  <a:srgbClr val="233A5B"/>
+                </a:solidFill>
+              </a:defRPr>
+            </a:lvl1pPr>
+            <a:lvl2pPr>
+              <a:defRPr>
+                <a:solidFill>
+                  <a:srgbClr val="233A5B"/>
+                </a:solidFill>
+              </a:defRPr>
+            </a:lvl2pPr>
+            <a:lvl3pPr>
+              <a:defRPr>
+                <a:solidFill>
+                  <a:srgbClr val="233A5B"/>
+                </a:solidFill>
+              </a:defRPr>
+            </a:lvl3pPr>
+            <a:lvl4pPr>
+              <a:defRPr>
+                <a:solidFill>
+                  <a:srgbClr val="233A5B"/>
+                </a:solidFill>
+              </a:defRPr>
+            </a:lvl4pPr>
+            <a:lvl5pPr>
+              <a:defRPr>
+                <a:solidFill>
+                  <a:srgbClr val="233A5B"/>
+                </a:solidFill>
+              </a:defRPr>
+            </a:lvl5pPr>
+          </a:lstStyle>
           <a:p>
             <a:pPr lvl="0"/>
             <a:r>
@@ -1974,7 +2013,7 @@
             <a:lvl1pPr algn="ctr">
               <a:defRPr sz="3600">
                 <a:solidFill>
-                  <a:srgbClr val="1A1A1A"/>
+                  <a:srgbClr val="F3E348"/>
                 </a:solidFill>
               </a:defRPr>
             </a:lvl1pPr>
@@ -2019,7 +2058,7 @@
               <a:buNone/>
               <a:defRPr sz="2000" b="0">
                 <a:solidFill>
-                  <a:srgbClr val="DC322F"/>
+                  <a:srgbClr val="F4F7FC"/>
                 </a:solidFill>
               </a:defRPr>
             </a:lvl1pPr>
@@ -2267,7 +2306,7 @@
             <a:lvl1pPr>
               <a:defRPr sz="3200">
                 <a:solidFill>
-                  <a:srgbClr val="DC322F"/>
+                  <a:srgbClr val="FBD01E"/>
                 </a:solidFill>
                 <a:latin typeface="Trebuchet MS" panose="020B0703020202090204" pitchFamily="34" charset="0"/>
                 <a:cs typeface="Arial" panose="020B0604020202020204" pitchFamily="34" charset="0"/>
@@ -2306,7 +2345,7 @@
             <a:lvl1pPr>
               <a:defRPr>
                 <a:solidFill>
-                  <a:srgbClr val="1A1A1A"/>
+                  <a:srgbClr val="F4F7FC"/>
                 </a:solidFill>
                 <a:latin typeface="Arial" panose="020B0604020202020204" pitchFamily="34" charset="0"/>
                 <a:cs typeface="Arial" panose="020B0604020202020204" pitchFamily="34" charset="0"/>
@@ -2315,7 +2354,7 @@
             <a:lvl2pPr>
               <a:defRPr>
                 <a:solidFill>
-                  <a:srgbClr val="1A1A1A"/>
+                  <a:srgbClr val="F4F7FC"/>
                 </a:solidFill>
                 <a:latin typeface="Arial" panose="020B0604020202020204" pitchFamily="34" charset="0"/>
                 <a:cs typeface="Arial" panose="020B0604020202020204" pitchFamily="34" charset="0"/>
@@ -2324,7 +2363,7 @@
             <a:lvl3pPr>
               <a:defRPr>
                 <a:solidFill>
-                  <a:srgbClr val="1A1A1A"/>
+                  <a:srgbClr val="F4F7FC"/>
                 </a:solidFill>
                 <a:latin typeface="Arial" panose="020B0604020202020204" pitchFamily="34" charset="0"/>
                 <a:cs typeface="Arial" panose="020B0604020202020204" pitchFamily="34" charset="0"/>
@@ -2333,7 +2372,7 @@
             <a:lvl4pPr>
               <a:defRPr>
                 <a:solidFill>
-                  <a:srgbClr val="1A1A1A"/>
+                  <a:srgbClr val="F4F7FC"/>
                 </a:solidFill>
                 <a:latin typeface="Arial" panose="020B0604020202020204" pitchFamily="34" charset="0"/>
                 <a:cs typeface="Arial" panose="020B0604020202020204" pitchFamily="34" charset="0"/>
@@ -2342,7 +2381,7 @@
             <a:lvl5pPr>
               <a:defRPr>
                 <a:solidFill>
-                  <a:srgbClr val="1A1A1A"/>
+                  <a:srgbClr val="F4F7FC"/>
                 </a:solidFill>
                 <a:latin typeface="Arial" panose="020B0604020202020204" pitchFamily="34" charset="0"/>
                 <a:cs typeface="Arial" panose="020B0604020202020204" pitchFamily="34" charset="0"/>
@@ -2494,6 +2533,14 @@
 <file path=ppt/slideLayouts/slideLayout3.xml><?xml version="1.0" encoding="utf-8"?>
 <p:sldLayout xmlns:a="http://schemas.openxmlformats.org/drawingml/2006/main" xmlns:r="http://schemas.openxmlformats.org/officeDocument/2006/relationships" xmlns:p="http://schemas.openxmlformats.org/presentationml/2006/main" preserve="1">
   <p:cSld name="Section Header">
+    <p:bg>
+      <p:bgPr>
+        <a:solidFill>
+          <a:srgbClr val="233A5B"/>
+        </a:solidFill>
+        <a:effectLst/>
+      </p:bgPr>
+    </p:bg>
     <p:spTree>
       <p:nvGrpSpPr>
         <p:cNvPr id="1" name=""/>
@@ -2541,7 +2588,7 @@
             <a:lvl1pPr algn="ctr">
               <a:defRPr sz="4400">
                 <a:solidFill>
-                  <a:srgbClr val="1A1A1A"/>
+                  <a:srgbClr val="FBD01E"/>
                 </a:solidFill>
               </a:defRPr>
             </a:lvl1pPr>
@@ -2707,7 +2754,7 @@
             <a:lvl1pPr>
               <a:defRPr>
                 <a:solidFill>
-                  <a:srgbClr val="DC322F"/>
+                  <a:srgbClr val="FBD01E"/>
                 </a:solidFill>
               </a:defRPr>
             </a:lvl1pPr>
@@ -2748,30 +2795,45 @@
           <a:lstStyle>
             <a:lvl1pPr>
               <a:defRPr>
+                <a:solidFill>
+                  <a:srgbClr val="F4F7FC"/>
+                </a:solidFill>
                 <a:latin typeface="Arial" panose="020B0604020202020204" pitchFamily="34" charset="0"/>
                 <a:cs typeface="Arial" panose="020B0604020202020204" pitchFamily="34" charset="0"/>
               </a:defRPr>
             </a:lvl1pPr>
             <a:lvl2pPr>
               <a:defRPr>
+                <a:solidFill>
+                  <a:srgbClr val="F4F7FC"/>
+                </a:solidFill>
                 <a:latin typeface="Arial" panose="020B0604020202020204" pitchFamily="34" charset="0"/>
                 <a:cs typeface="Arial" panose="020B0604020202020204" pitchFamily="34" charset="0"/>
               </a:defRPr>
             </a:lvl2pPr>
             <a:lvl3pPr>
               <a:defRPr>
+                <a:solidFill>
+                  <a:srgbClr val="F4F7FC"/>
+                </a:solidFill>
                 <a:latin typeface="Arial" panose="020B0604020202020204" pitchFamily="34" charset="0"/>
                 <a:cs typeface="Arial" panose="020B0604020202020204" pitchFamily="34" charset="0"/>
               </a:defRPr>
             </a:lvl3pPr>
             <a:lvl4pPr>
               <a:defRPr>
+                <a:solidFill>
+                  <a:srgbClr val="F4F7FC"/>
+                </a:solidFill>
                 <a:latin typeface="Arial" panose="020B0604020202020204" pitchFamily="34" charset="0"/>
                 <a:cs typeface="Arial" panose="020B0604020202020204" pitchFamily="34" charset="0"/>
               </a:defRPr>
             </a:lvl4pPr>
             <a:lvl5pPr>
               <a:defRPr>
+                <a:solidFill>
+                  <a:srgbClr val="F4F7FC"/>
+                </a:solidFill>
                 <a:latin typeface="Arial" panose="020B0604020202020204" pitchFamily="34" charset="0"/>
                 <a:cs typeface="Arial" panose="020B0604020202020204" pitchFamily="34" charset="0"/>
               </a:defRPr>
@@ -2842,30 +2904,45 @@
           <a:lstStyle>
             <a:lvl1pPr>
               <a:defRPr>
+                <a:solidFill>
+                  <a:srgbClr val="F4F7FC"/>
+                </a:solidFill>
                 <a:latin typeface="Arial" panose="020B0604020202020204" pitchFamily="34" charset="0"/>
                 <a:cs typeface="Arial" panose="020B0604020202020204" pitchFamily="34" charset="0"/>
               </a:defRPr>
             </a:lvl1pPr>
             <a:lvl2pPr>
               <a:defRPr>
+                <a:solidFill>
+                  <a:srgbClr val="F4F7FC"/>
+                </a:solidFill>
                 <a:latin typeface="Arial" panose="020B0604020202020204" pitchFamily="34" charset="0"/>
                 <a:cs typeface="Arial" panose="020B0604020202020204" pitchFamily="34" charset="0"/>
               </a:defRPr>
             </a:lvl2pPr>
             <a:lvl3pPr>
               <a:defRPr>
+                <a:solidFill>
+                  <a:srgbClr val="F4F7FC"/>
+                </a:solidFill>
                 <a:latin typeface="Arial" panose="020B0604020202020204" pitchFamily="34" charset="0"/>
                 <a:cs typeface="Arial" panose="020B0604020202020204" pitchFamily="34" charset="0"/>
               </a:defRPr>
             </a:lvl3pPr>
             <a:lvl4pPr>
               <a:defRPr>
+                <a:solidFill>
+                  <a:srgbClr val="F4F7FC"/>
+                </a:solidFill>
                 <a:latin typeface="Arial" panose="020B0604020202020204" pitchFamily="34" charset="0"/>
                 <a:cs typeface="Arial" panose="020B0604020202020204" pitchFamily="34" charset="0"/>
               </a:defRPr>
             </a:lvl4pPr>
             <a:lvl5pPr>
               <a:defRPr>
+                <a:solidFill>
+                  <a:srgbClr val="F4F7FC"/>
+                </a:solidFill>
                 <a:latin typeface="Arial" panose="020B0604020202020204" pitchFamily="34" charset="0"/>
                 <a:cs typeface="Arial" panose="020B0604020202020204" pitchFamily="34" charset="0"/>
               </a:defRPr>
@@ -3061,7 +3138,7 @@
             <a:lvl1pPr>
               <a:defRPr>
                 <a:solidFill>
-                  <a:srgbClr val="DC322F"/>
+                  <a:srgbClr val="233A5B"/>
                 </a:solidFill>
               </a:defRPr>
             </a:lvl1pPr>
@@ -3106,7 +3183,7 @@
               <a:buNone/>
               <a:defRPr sz="1600" b="1">
                 <a:solidFill>
-                  <a:srgbClr val="1A1A1A"/>
+                  <a:srgbClr val="233A5B"/>
                 </a:solidFill>
               </a:defRPr>
             </a:lvl1pPr>
@@ -3176,7 +3253,43 @@
         </p:spPr>
         <p:txBody>
           <a:bodyPr/>
-          <a:lstStyle/>
+          <a:lstStyle>
+            <a:lvl1pPr>
+              <a:defRPr>
+                <a:solidFill>
+                  <a:srgbClr val="233A5B"/>
+                </a:solidFill>
+              </a:defRPr>
+            </a:lvl1pPr>
+            <a:lvl2pPr>
+              <a:defRPr>
+                <a:solidFill>
+                  <a:srgbClr val="233A5B"/>
+                </a:solidFill>
+              </a:defRPr>
+            </a:lvl2pPr>
+            <a:lvl3pPr>
+              <a:defRPr>
+                <a:solidFill>
+                  <a:srgbClr val="233A5B"/>
+                </a:solidFill>
+              </a:defRPr>
+            </a:lvl3pPr>
+            <a:lvl4pPr>
+              <a:defRPr>
+                <a:solidFill>
+                  <a:srgbClr val="233A5B"/>
+                </a:solidFill>
+              </a:defRPr>
+            </a:lvl4pPr>
+            <a:lvl5pPr>
+              <a:defRPr>
+                <a:solidFill>
+                  <a:srgbClr val="233A5B"/>
+                </a:solidFill>
+              </a:defRPr>
+            </a:lvl5pPr>
+          </a:lstStyle>
           <a:p>
             <a:pPr lvl="0"/>
             <a:r>
@@ -3246,7 +3359,7 @@
               <a:buNone/>
               <a:defRPr sz="1600" b="1">
                 <a:solidFill>
-                  <a:srgbClr val="1A1A1A"/>
+                  <a:srgbClr val="233A5B"/>
                 </a:solidFill>
               </a:defRPr>
             </a:lvl1pPr>
@@ -3316,42 +3429,78 @@
         </p:spPr>
         <p:txBody>
           <a:bodyPr/>
-          <a:lstStyle/>
-          <a:p>
-            <a:pPr lvl="0"/>
-            <a:r>
-              <a:rPr lang="en-GB"/>
+          <a:lstStyle>
+            <a:lvl1pPr>
+              <a:defRPr>
+                <a:solidFill>
+                  <a:srgbClr val="233A5B"/>
+                </a:solidFill>
+              </a:defRPr>
+            </a:lvl1pPr>
+            <a:lvl2pPr>
+              <a:defRPr>
+                <a:solidFill>
+                  <a:srgbClr val="233A5B"/>
+                </a:solidFill>
+              </a:defRPr>
+            </a:lvl2pPr>
+            <a:lvl3pPr>
+              <a:defRPr>
+                <a:solidFill>
+                  <a:srgbClr val="233A5B"/>
+                </a:solidFill>
+              </a:defRPr>
+            </a:lvl3pPr>
+            <a:lvl4pPr>
+              <a:defRPr>
+                <a:solidFill>
+                  <a:srgbClr val="233A5B"/>
+                </a:solidFill>
+              </a:defRPr>
+            </a:lvl4pPr>
+            <a:lvl5pPr>
+              <a:defRPr>
+                <a:solidFill>
+                  <a:srgbClr val="233A5B"/>
+                </a:solidFill>
+              </a:defRPr>
+            </a:lvl5pPr>
+          </a:lstStyle>
+          <a:p>
+            <a:pPr lvl="0"/>
+            <a:r>
+              <a:rPr lang="en-GB" dirty="0"/>
               <a:t>Click to edit Master text styles</a:t>
             </a:r>
           </a:p>
           <a:p>
             <a:pPr lvl="1"/>
             <a:r>
-              <a:rPr lang="en-GB"/>
+              <a:rPr lang="en-GB" dirty="0"/>
               <a:t>Second level</a:t>
             </a:r>
           </a:p>
           <a:p>
             <a:pPr lvl="2"/>
             <a:r>
-              <a:rPr lang="en-GB"/>
+              <a:rPr lang="en-GB" dirty="0"/>
               <a:t>Third level</a:t>
             </a:r>
           </a:p>
           <a:p>
             <a:pPr lvl="3"/>
             <a:r>
-              <a:rPr lang="en-GB"/>
+              <a:rPr lang="en-GB" dirty="0"/>
               <a:t>Fourth level</a:t>
             </a:r>
           </a:p>
           <a:p>
             <a:pPr lvl="4"/>
             <a:r>
-              <a:rPr lang="en-GB"/>
+              <a:rPr lang="en-GB" dirty="0"/>
               <a:t>Fifth level</a:t>
             </a:r>
-            <a:endParaRPr lang="en-US"/>
+            <a:endParaRPr lang="en-US" dirty="0"/>
           </a:p>
         </p:txBody>
       </p:sp>
@@ -3507,7 +3656,7 @@
             <a:lvl1pPr>
               <a:defRPr>
                 <a:solidFill>
-                  <a:srgbClr val="DC322F"/>
+                  <a:srgbClr val="FBD01E"/>
                 </a:solidFill>
               </a:defRPr>
             </a:lvl1pPr>
@@ -3796,7 +3945,7 @@
             <a:lvl1pPr>
               <a:defRPr sz="2800">
                 <a:solidFill>
-                  <a:srgbClr val="DC322F"/>
+                  <a:srgbClr val="FBD01E"/>
                 </a:solidFill>
               </a:defRPr>
             </a:lvl1pPr>
@@ -3836,19 +3985,39 @@
           <a:bodyPr/>
           <a:lstStyle>
             <a:lvl1pPr>
-              <a:defRPr sz="1800"/>
+              <a:defRPr sz="1800">
+                <a:solidFill>
+                  <a:srgbClr val="233A5B"/>
+                </a:solidFill>
+              </a:defRPr>
             </a:lvl1pPr>
             <a:lvl2pPr>
-              <a:defRPr sz="1575"/>
+              <a:defRPr sz="1575">
+                <a:solidFill>
+                  <a:srgbClr val="233A5B"/>
+                </a:solidFill>
+              </a:defRPr>
             </a:lvl2pPr>
             <a:lvl3pPr>
-              <a:defRPr sz="1350"/>
+              <a:defRPr sz="1350">
+                <a:solidFill>
+                  <a:srgbClr val="233A5B"/>
+                </a:solidFill>
+              </a:defRPr>
             </a:lvl3pPr>
             <a:lvl4pPr>
-              <a:defRPr sz="1125"/>
+              <a:defRPr sz="1125">
+                <a:solidFill>
+                  <a:srgbClr val="233A5B"/>
+                </a:solidFill>
+              </a:defRPr>
             </a:lvl4pPr>
             <a:lvl5pPr>
-              <a:defRPr sz="1125"/>
+              <a:defRPr sz="1125">
+                <a:solidFill>
+                  <a:srgbClr val="233A5B"/>
+                </a:solidFill>
+              </a:defRPr>
             </a:lvl5pPr>
             <a:lvl6pPr>
               <a:defRPr sz="1125"/>
@@ -3930,7 +4099,11 @@
           <a:lstStyle>
             <a:lvl1pPr marL="0" indent="0">
               <a:buNone/>
-              <a:defRPr sz="1800"/>
+              <a:defRPr sz="1800">
+                <a:solidFill>
+                  <a:srgbClr val="F4F7FC"/>
+                </a:solidFill>
+              </a:defRPr>
             </a:lvl1pPr>
             <a:lvl2pPr marL="257175" indent="0">
               <a:buNone/>
@@ -4128,7 +4301,7 @@
             <a:lvl1pPr>
               <a:defRPr sz="2800">
                 <a:solidFill>
-                  <a:srgbClr val="DC322F"/>
+                  <a:srgbClr val="FBD01E"/>
                 </a:solidFill>
               </a:defRPr>
             </a:lvl1pPr>
@@ -4242,7 +4415,11 @@
           <a:lstStyle>
             <a:lvl1pPr marL="0" indent="0">
               <a:buNone/>
-              <a:defRPr sz="1800"/>
+              <a:defRPr sz="1800">
+                <a:solidFill>
+                  <a:srgbClr val="F4F7FC"/>
+                </a:solidFill>
+              </a:defRPr>
             </a:lvl1pPr>
             <a:lvl2pPr marL="257175" indent="0">
               <a:buNone/>
@@ -4396,7 +4573,7 @@
     <p:bg>
       <p:bgPr>
         <a:solidFill>
-          <a:srgbClr val="FFF8E7"/>
+          <a:srgbClr val="233A5B"/>
         </a:solidFill>
         <a:effectLst/>
       </p:bgPr>
@@ -4693,7 +4870,7 @@
         <a:buNone/>
         <a:defRPr b="1" baseline="0" i="0" kern="1200" sz="3200">
           <a:solidFill>
-            <a:srgbClr val="DC322F"/>
+            <a:srgbClr val="FBD01E"/>
           </a:solidFill>
           <a:latin charset="0" panose="020B0703020202090204" pitchFamily="34" typeface="Trebuchet MS"/>
           <a:ea typeface="+mj-ea"/>
@@ -4713,7 +4890,7 @@
         <a:buChar char="•"/>
         <a:defRPr b="0" baseline="0" i="0" kern="1200" sz="1800">
           <a:solidFill>
-            <a:srgbClr val="1A1A1A"/>
+            <a:srgbClr val="F4F7FC"/>
           </a:solidFill>
           <a:latin charset="0" panose="020B0604020202020204" pitchFamily="34" typeface="Arial"/>
           <a:ea typeface="+mn-ea"/>
@@ -4731,7 +4908,7 @@
         <a:buChar char="•"/>
         <a:defRPr b="0" baseline="0" i="0" kern="1200" sz="1800">
           <a:solidFill>
-            <a:srgbClr val="1A1A1A"/>
+            <a:srgbClr val="F4F7FC"/>
           </a:solidFill>
           <a:latin charset="0" panose="020B0604020202020204" pitchFamily="34" typeface="Arial"/>
           <a:ea typeface="+mn-ea"/>
@@ -4749,7 +4926,7 @@
         <a:buChar char="•"/>
         <a:defRPr b="0" baseline="0" i="0" kern="1200" sz="1800">
           <a:solidFill>
-            <a:srgbClr val="1A1A1A"/>
+            <a:srgbClr val="F4F7FC"/>
           </a:solidFill>
           <a:latin charset="0" panose="020B0604020202020204" pitchFamily="34" typeface="Arial"/>
           <a:ea typeface="+mn-ea"/>
@@ -4767,7 +4944,7 @@
         <a:buChar char="•"/>
         <a:defRPr b="0" baseline="0" i="0" kern="1200" sz="1800">
           <a:solidFill>
-            <a:srgbClr val="1A1A1A"/>
+            <a:srgbClr val="F4F7FC"/>
           </a:solidFill>
           <a:latin charset="0" panose="020B0604020202020204" pitchFamily="34" typeface="Arial"/>
           <a:ea typeface="+mn-ea"/>
@@ -4785,7 +4962,7 @@
         <a:buChar char="•"/>
         <a:defRPr b="0" baseline="0" i="0" kern="1200" sz="1800">
           <a:solidFill>
-            <a:srgbClr val="1A1A1A"/>
+            <a:srgbClr val="F4F7FC"/>
           </a:solidFill>
           <a:latin charset="0" panose="020B0604020202020204" pitchFamily="34" typeface="Arial"/>
           <a:ea typeface="+mn-ea"/>
@@ -5110,7 +5287,7 @@
             </a:pPr>
             <a:r>
               <a:rPr/>
-              <a:t>6. SupplyLens (formerly Knopenkoning)</a:t>
+              <a:t>5. AI-Supported Student Projects</a:t>
             </a:r>
           </a:p>
         </p:txBody>
@@ -5141,124 +5318,23 @@
             </a:pPr>
             <a:r>
               <a:rPr/>
-              <a:t>Goal: Visualize complex supply chains using a combination of AI, ESG data, and graph technology.</a:t>
-            </a:r>
-          </a:p>
-          <a:p>
-            <a:pPr lvl="0" indent="0" marL="0">
-              <a:buNone/>
-            </a:pPr>
-            <a:r>
-              <a:rPr/>
-              <a:t>Why:</a:t>
-            </a:r>
-            <a:br/>
-            <a:r>
-              <a:rPr/>
-              <a:t>- Supports CSRD/CSDDD compliance</a:t>
-            </a:r>
-            <a:br/>
-            <a:r>
-              <a:rPr/>
-              <a:t>- Enables risk mapping, transparency, and actionable insights</a:t>
-            </a:r>
-            <a:br/>
-            <a:r>
-              <a:rPr/>
-              <a:t>- Real use for real complexity</a:t>
-            </a:r>
-          </a:p>
-          <a:p>
-            <a:pPr lvl="0" indent="0" marL="0">
-              <a:buNone/>
-            </a:pPr>
-            <a:r>
-              <a:rPr/>
-              <a:t>Why Now:</a:t>
-            </a:r>
-            <a:br/>
-            <a:r>
-              <a:rPr/>
-              <a:t>- Lessons learned from previous attempt (Sebastien encounter)</a:t>
-            </a:r>
-            <a:br/>
-            <a:r>
-              <a:rPr/>
-              <a:t>- Renewed clarity, realism, and enthusiasm</a:t>
-            </a:r>
-            <a:br/>
-            <a:r>
-              <a:rPr/>
-              <a:t>- Ongoing interest from the AI community to contribute</a:t>
-            </a:r>
-            <a:br/>
-            <a:r>
-              <a:rPr/>
-              <a:t>- Chris has developed a new, feasible approach</a:t>
-            </a:r>
-          </a:p>
-          <a:p>
-            <a:pPr lvl="0" indent="0" marL="0">
-              <a:buNone/>
-            </a:pPr>
-            <a:r>
-              <a:rPr/>
-              <a:t>Accomplished: - New direction and architecture defined</a:t>
-            </a:r>
-            <a:br/>
-            <a:r>
-              <a:rPr/>
-              <a:t>- GitHub + live demo prepared: - </a:t>
+              <a:t>Examples: - </a:t>
+            </a:r>
+            <a:r>
+              <a:rPr>
+                <a:hlinkClick r:id="rId2"/>
+              </a:rPr>
+              <a:t>VCH-Lithium</a:t>
+            </a:r>
+            <a:r>
+              <a:rPr/>
+              <a:t> - </a:t>
             </a:r>
             <a:r>
               <a:rPr>
                 <a:hlinkClick r:id="rId3"/>
               </a:rPr>
-              <a:t>GitHub</a:t>
-            </a:r>
-            <a:br/>
-            <a:r>
-              <a:rPr/>
-              <a:t>- </a:t>
-            </a:r>
-            <a:r>
-              <a:rPr>
-                <a:hlinkClick r:id="rId4"/>
-              </a:rPr>
-              <a:t>Demo</a:t>
-            </a:r>
-          </a:p>
-          <a:p>
-            <a:pPr lvl="0" indent="0" marL="0">
-              <a:buNone/>
-            </a:pPr>
-            <a:r>
-              <a:rPr/>
-              <a:t>Next Steps: - Greenlight to begin ideation</a:t>
-            </a:r>
-            <a:br/>
-            <a:r>
-              <a:rPr/>
-              <a:t>- Allocation of focused working hours</a:t>
-            </a:r>
-            <a:br/>
-            <a:r>
-              <a:rPr/>
-              <a:t>- Approval to form a dedicated Scrum team</a:t>
-            </a:r>
-          </a:p>
-          <a:p>
-            <a:pPr lvl="0" indent="0" marL="0">
-              <a:buNone/>
-            </a:pPr>
-            <a:r>
-              <a:rPr/>
-              <a:t>Help Needed: - Permission to proceed and bring in trusted external contributors (free) - Split this off from Value Chain Hackers as it’s own initiative, with a kvk, domain etc. - Minimal prototype budget (&lt; €5K) for infrastructure and testing</a:t>
-            </a:r>
-            <a:br/>
-            <a:r>
-              <a:rPr/>
-              <a:t>- Space to experiment and iterate with a core team, allow chris to work with externals.</a:t>
+              <a:t>VCH-BCM</a:t>
             </a:r>
           </a:p>
         </p:txBody>
@@ -5287,57 +5363,18 @@
       </p:grpSpPr>
       <p:sp>
         <p:nvSpPr>
-          <p:cNvPr id="2" name="Title 1">
-            <a:extLst>
-              <a:ext uri="{FF2B5EF4-FFF2-40B4-BE49-F238E27FC236}">
-                <a16:creationId xmlns:a16="http://schemas.microsoft.com/office/drawing/2014/main" id="{DD9B8E45-0772-954C-8D4B-6E6808DFEDED}"/>
-              </a:ext>
-            </a:extLst>
-          </p:cNvPr>
-          <p:cNvSpPr>
-            <a:spLocks noGrp="1"/>
-          </p:cNvSpPr>
-          <p:nvPr>
-            <p:ph type="title"/>
-          </p:nvPr>
-        </p:nvSpPr>
-        <p:spPr>
-          <a:xfrm>
-            <a:off x="838200" y="365129"/>
-            <a:ext cx="10515600" cy="1325563"/>
-          </a:xfrm>
-          <a:prstGeom prst="rect">
-            <a:avLst/>
-          </a:prstGeom>
-        </p:spPr>
-        <p:txBody>
-          <a:bodyPr/>
-          <a:lstStyle/>
-          <a:p>
-            <a:pPr lvl="0" indent="0" marL="0">
-              <a:buNone/>
-            </a:pPr>
-            <a:r>
-              <a:rPr/>
-              <a:t>7. Experimental Tool Testing – AI Scientist, Far.AI</a:t>
-            </a:r>
-          </a:p>
-        </p:txBody>
-      </p:sp>
-      <p:sp>
-        <p:nvSpPr>
           <p:cNvPr id="3" name="Content Placeholder 2">
             <a:extLst>
               <a:ext uri="{FF2B5EF4-FFF2-40B4-BE49-F238E27FC236}">
-                <a16:creationId xmlns:a16="http://schemas.microsoft.com/office/drawing/2014/main" id="{A4EB24F9-04F1-C843-9D71-56C5C024552B}"/>
-              </a:ext>
-            </a:extLst>
-          </p:cNvPr>
-          <p:cNvSpPr>
-            <a:spLocks noGrp="1"/>
-          </p:cNvSpPr>
-          <p:nvPr>
-            <p:ph idx="1"/>
+                <a16:creationId xmlns:a16="http://schemas.microsoft.com/office/drawing/2014/main" id="{63FA7BF1-44B1-744C-AB68-4BB0A6A5977E}"/>
+              </a:ext>
+            </a:extLst>
+          </p:cNvPr>
+          <p:cNvSpPr>
+            <a:spLocks noGrp="1"/>
+          </p:cNvSpPr>
+          <p:nvPr>
+            <p:ph idx="1" sz="half"/>
           </p:nvPr>
         </p:nvSpPr>
         <p:spPr/>
@@ -5350,99 +5387,190 @@
             </a:pPr>
             <a:r>
               <a:rPr/>
-              <a:t>Goal: Explore emerging AI tools that support scientific workflows — from multi-step reasoning to automated experimentation.</a:t>
-            </a:r>
-          </a:p>
-          <a:p>
-            <a:pPr lvl="0" indent="0" marL="0">
-              <a:buNone/>
-            </a:pPr>
-            <a:r>
-              <a:rPr/>
-              <a:t>Why:</a:t>
+              <a:t>🎯 Goal:</a:t>
             </a:r>
             <a:br/>
             <a:r>
               <a:rPr/>
-              <a:t>- Keep Windesheim connected to the frontier of AI development</a:t>
+              <a:t>Support student-led projects by giving them AI tools that just work — not expecting them to build infrastructure.</a:t>
+            </a:r>
+          </a:p>
+          <a:p>
+            <a:pPr lvl="0" indent="0" marL="0">
+              <a:buNone/>
+            </a:pPr>
+            <a:r>
+              <a:rPr/>
+              <a:t>💡 Why:</a:t>
             </a:r>
             <a:br/>
             <a:r>
               <a:rPr/>
-              <a:t>- Investigate tools that can:</a:t>
+              <a:t>As Maxime correctly noted: most students can’t build their own AI pipelines.</a:t>
             </a:r>
             <a:br/>
             <a:r>
               <a:rPr/>
-              <a:t>- Automate cyber attack simulation</a:t>
+              <a:t>Instead, we:</a:t>
+            </a:r>
+          </a:p>
+          <a:p>
+            <a:pPr lvl="0"/>
+            <a:r>
+              <a:rPr/>
+              <a:t>Provide working, end-user-facing tools (not chatbots)</a:t>
+            </a:r>
+          </a:p>
+          <a:p>
+            <a:pPr lvl="0"/>
+            <a:r>
+              <a:rPr/>
+              <a:t>Focus on prompting, saving, and processing</a:t>
+            </a:r>
+          </a:p>
+          <a:p>
+            <a:pPr lvl="0"/>
+            <a:r>
+              <a:rPr/>
+              <a:t>Teach integration with commercial and internal systems</a:t>
             </a:r>
             <a:br/>
             <a:r>
               <a:rPr/>
-              <a:t>- Assist in generating PhD-level research</a:t>
-            </a:r>
-            <a:br/>
-            <a:r>
-              <a:rPr/>
-              <a:t>- Handle complex multi-step processing</a:t>
-            </a:r>
-            <a:br/>
-            <a:r>
-              <a:rPr/>
-              <a:t>These tools could reshape the way academic research is conducted.</a:t>
-            </a:r>
-          </a:p>
-          <a:p>
-            <a:pPr lvl="0" indent="0" marL="0">
-              <a:buNone/>
-            </a:pPr>
-            <a:r>
-              <a:rPr/>
-              <a:t>Accomplished: - Reviewed AI Scientist and Far.AI projects</a:t>
-            </a:r>
-            <a:br/>
-            <a:r>
-              <a:rPr/>
-              <a:t>- Identified promising capabilities and applications</a:t>
-            </a:r>
-            <a:br/>
-            <a:r>
-              <a:rPr/>
-              <a:t>- Repository bookmarked:</a:t>
-            </a:r>
-            <a:br/>
-            <a:r>
-              <a:rPr/>
-              <a:t>- </a:t>
-            </a:r>
-            <a:r>
-              <a:rPr>
-                <a:hlinkClick r:id="rId3"/>
-              </a:rPr>
-              <a:t>GitHub – AI Scientist (aci)</a:t>
-            </a:r>
-          </a:p>
-          <a:p>
-            <a:pPr lvl="0" indent="0" marL="0">
-              <a:buNone/>
-            </a:pPr>
-            <a:r>
-              <a:rPr/>
-              <a:t>Next Steps: - Actively test 3 tools to evaluate research potential</a:t>
-            </a:r>
-            <a:br/>
-            <a:r>
-              <a:rPr/>
-              <a:t>- Identify barriers and integration opportunities</a:t>
-            </a:r>
-          </a:p>
-          <a:p>
-            <a:pPr lvl="0" indent="0" marL="0">
-              <a:buNone/>
-            </a:pPr>
-            <a:r>
-              <a:rPr/>
-              <a:t>Help Needed: - Token budget required to run and evaluate these tools properly</a:t>
+              <a:t>This approach delivers value — not confusion.</a:t>
+            </a:r>
+          </a:p>
+          <a:p>
+            <a:pPr lvl="0" indent="0" marL="0">
+              <a:buNone/>
+            </a:pPr>
+            <a:r>
+              <a:rPr/>
+              <a:t>✅ Accomplished:</a:t>
+            </a:r>
+          </a:p>
+          <a:p>
+            <a:pPr lvl="0"/>
+            <a:r>
+              <a:rPr/>
+              <a:t>Built 2 functional AI-driven websites</a:t>
+            </a:r>
+          </a:p>
+          <a:p>
+            <a:pPr lvl="0"/>
+            <a:r>
+              <a:rPr/>
+              <a:t>Far surpassed what students could do solo</a:t>
+            </a:r>
+          </a:p>
+          <a:p>
+            <a:pPr lvl="0"/>
+            <a:r>
+              <a:rPr/>
+              <a:t>Demonstrated how AI mentorship accelerates outcomes</a:t>
+            </a:r>
+          </a:p>
+        </p:txBody>
+      </p:sp>
+      <p:sp>
+        <p:nvSpPr>
+          <p:cNvPr id="4" name="Content Placeholder 3">
+            <a:extLst>
+              <a:ext uri="{FF2B5EF4-FFF2-40B4-BE49-F238E27FC236}">
+                <a16:creationId xmlns:a16="http://schemas.microsoft.com/office/drawing/2014/main" id="{3B974A49-6A1E-2F48-B419-02B0A17B9692}"/>
+              </a:ext>
+            </a:extLst>
+          </p:cNvPr>
+          <p:cNvSpPr>
+            <a:spLocks noGrp="1"/>
+          </p:cNvSpPr>
+          <p:nvPr>
+            <p:ph idx="2" sz="half"/>
+          </p:nvPr>
+        </p:nvSpPr>
+        <p:spPr/>
+        <p:txBody>
+          <a:bodyPr/>
+          <a:lstStyle/>
+          <a:p>
+            <a:pPr lvl="0" indent="0" marL="0">
+              <a:buNone/>
+            </a:pPr>
+            <a:r>
+              <a:rPr/>
+              <a:t>🚀 Next Steps:</a:t>
+            </a:r>
+          </a:p>
+          <a:p>
+            <a:pPr lvl="0"/>
+            <a:r>
+              <a:rPr/>
+              <a:t>Showcase student outcomes</a:t>
+            </a:r>
+          </a:p>
+          <a:p>
+            <a:pPr lvl="0"/>
+            <a:r>
+              <a:rPr/>
+              <a:t>Formalize an AI mentorship pathway</a:t>
+            </a:r>
+          </a:p>
+          <a:p>
+            <a:pPr lvl="0"/>
+            <a:r>
+              <a:rPr/>
+              <a:t>Identify new use cases with real needs</a:t>
+            </a:r>
+          </a:p>
+          <a:p>
+            <a:pPr lvl="0" indent="0" marL="0">
+              <a:buNone/>
+            </a:pPr>
+            <a:r>
+              <a:rPr/>
+              <a:t>🆘 Help Needed:</a:t>
+            </a:r>
+          </a:p>
+          <a:p>
+            <a:pPr lvl="0"/>
+            <a:r>
+              <a:rPr/>
+              <a:t>Stop limiting expert-student interaction</a:t>
+            </a:r>
+          </a:p>
+          <a:p>
+            <a:pPr lvl="0"/>
+            <a:r>
+              <a:rPr/>
+              <a:t>Start providing token budgets for large model usage</a:t>
+            </a:r>
+          </a:p>
+          <a:p>
+            <a:pPr lvl="0"/>
+            <a:r>
+              <a:rPr/>
+              <a:t>Stop comparing this and Chris to OpenAI — that’s unrealistic</a:t>
+            </a:r>
+          </a:p>
+          <a:p>
+            <a:pPr lvl="0"/>
+            <a:r>
+              <a:rPr/>
+              <a:t>Start letting external experts interface (e.g. via Discord)</a:t>
+            </a:r>
+          </a:p>
+          <a:p>
+            <a:pPr lvl="0"/>
+            <a:r>
+              <a:rPr/>
+              <a:t>Start treating Value Chain Hackers as a formal initiative: KvK, domain, mandate</a:t>
+            </a:r>
+          </a:p>
+          <a:p>
+            <a:pPr lvl="0"/>
+            <a:r>
+              <a:rPr/>
+              <a:t>Start giving Chris a team of IT + business students to scale AI work</a:t>
             </a:r>
           </a:p>
         </p:txBody>
@@ -5503,7 +5631,7 @@
             </a:pPr>
             <a:r>
               <a:rPr/>
-              <a:t>8. Project Proposal – ClearRoots</a:t>
+              <a:t>6. SupplyLens (formerly Knopenkoning)</a:t>
             </a:r>
           </a:p>
         </p:txBody>
@@ -5534,93 +5662,230 @@
             </a:pPr>
             <a:r>
               <a:rPr/>
-              <a:t>Goal: Build a digital platform to help smallholder cooperatives and EU SME importers comply with EU sustainability laws (CSRD, CSDDD, EUDR).</a:t>
-            </a:r>
-          </a:p>
-          <a:p>
-            <a:pPr lvl="0" indent="0" marL="0">
-              <a:buNone/>
-            </a:pPr>
-            <a:r>
-              <a:rPr/>
-              <a:t>How It Works: - Cooperatives enter data via a multilingual, offline-capable mobile app</a:t>
+              <a:t>Examples: - </a:t>
+            </a:r>
+            <a:r>
+              <a:rPr>
+                <a:hlinkClick r:id="rId2"/>
+              </a:rPr>
+              <a:t>VCH-Supplylens</a:t>
+            </a:r>
+            <a:r>
+              <a:rPr/>
+              <a:t> - </a:t>
+            </a:r>
+            <a:r>
+              <a:rPr>
+                <a:hlinkClick r:id="rId3"/>
+              </a:rPr>
+              <a:t>Presentation</a:t>
+            </a:r>
+            <a:r>
+              <a:rPr/>
+              <a:t> :::::::::::::: {.columns} ::: {.column width=“50%”}</a:t>
+            </a:r>
+          </a:p>
+          <a:p>
+            <a:pPr lvl="0" indent="0" marL="0">
+              <a:buNone/>
+            </a:pPr>
+            <a:r>
+              <a:rPr/>
+              <a:t>🎯 Goal:</a:t>
             </a:r>
             <a:br/>
             <a:r>
               <a:rPr/>
-              <a:t>- Data is time-stamped and stored on AgUnity’s blockchain for traceability</a:t>
-            </a:r>
-            <a:br/>
-            <a:r>
-              <a:rPr/>
-              <a:t>- System guides users through EU-aligned documentation workflows</a:t>
-            </a:r>
-            <a:br/>
-            <a:r>
-              <a:rPr/>
-              <a:t>- Importers receive ready-to-submit compliance dossiers for each shipment</a:t>
-            </a:r>
-          </a:p>
-          <a:p>
-            <a:pPr lvl="0" indent="0" marL="0">
-              <a:buNone/>
-            </a:pPr>
-            <a:r>
-              <a:rPr/>
-              <a:t>Why It Matters: - EU rules now require sustainability documentation that smallholders can’t easily produce</a:t>
-            </a:r>
-            <a:br/>
-            <a:r>
-              <a:rPr/>
-              <a:t>- Importers lack practical tools to meet compliance requirements</a:t>
-            </a:r>
-            <a:br/>
-            <a:r>
-              <a:rPr/>
-              <a:t>- This platform enables both sides to comply — without exclusion or greenwashing</a:t>
-            </a:r>
-          </a:p>
-          <a:p>
-            <a:pPr lvl="0" indent="0" marL="0">
-              <a:buNone/>
-            </a:pPr>
-            <a:r>
-              <a:rPr/>
-              <a:t>Current Status: - Drafted core logic, roles, and compliance flow</a:t>
-            </a:r>
-            <a:br/>
-            <a:r>
-              <a:rPr/>
-              <a:t>- Identified pilot framework and documentation logic</a:t>
-            </a:r>
-            <a:br/>
-            <a:r>
-              <a:rPr/>
-              <a:t>- Initial partners: AgUnity, Windesheim, SCF NICE</a:t>
-            </a:r>
-            <a:br/>
-            <a:r>
-              <a:rPr/>
-              <a:t>- First pitch deck and 1-pager created</a:t>
-            </a:r>
-          </a:p>
-          <a:p>
-            <a:pPr lvl="0" indent="0" marL="0">
-              <a:buNone/>
-            </a:pPr>
-            <a:r>
-              <a:rPr/>
-              <a:t>Help Needed: - Funding or co-development support to move into implementation</a:t>
-            </a:r>
-            <a:br/>
-            <a:r>
-              <a:rPr/>
-              <a:t>- Support turning this into a grant proposal</a:t>
-            </a:r>
-            <a:br/>
-            <a:r>
-              <a:rPr/>
-              <a:t>- A grant writer or strategic partner to help secure next steps</a:t>
+              <a:t>Visualize complex supply chains using AI, ESG data, and graph technology.</a:t>
+            </a:r>
+          </a:p>
+          <a:p>
+            <a:pPr lvl="0" indent="0" marL="0">
+              <a:buNone/>
+            </a:pPr>
+            <a:r>
+              <a:rPr/>
+              <a:t>📌 Why:</a:t>
+            </a:r>
+          </a:p>
+          <a:p>
+            <a:pPr lvl="0"/>
+            <a:r>
+              <a:rPr/>
+              <a:t>Supports CSRD/CSDDD compliance</a:t>
+            </a:r>
+          </a:p>
+          <a:p>
+            <a:pPr lvl="0"/>
+            <a:r>
+              <a:rPr/>
+              <a:t>Enables supply chain risk mapping</a:t>
+            </a:r>
+          </a:p>
+          <a:p>
+            <a:pPr lvl="0"/>
+            <a:r>
+              <a:rPr/>
+              <a:t>Provides actionable insights into real complexity</a:t>
+            </a:r>
+          </a:p>
+          <a:p>
+            <a:pPr lvl="0" indent="0" marL="0">
+              <a:buNone/>
+            </a:pPr>
+            <a:r>
+              <a:rPr/>
+              <a:t>⏳ Why Now:</a:t>
+            </a:r>
+          </a:p>
+          <a:p>
+            <a:pPr lvl="0"/>
+            <a:r>
+              <a:rPr/>
+              <a:t>Lessons learned from previous attempt (Sebastien)</a:t>
+            </a:r>
+          </a:p>
+          <a:p>
+            <a:pPr lvl="0"/>
+            <a:r>
+              <a:rPr/>
+              <a:t>Renewed clarity and realistic expectations</a:t>
+            </a:r>
+          </a:p>
+          <a:p>
+            <a:pPr lvl="0"/>
+            <a:r>
+              <a:rPr/>
+              <a:t>Strong community interest</a:t>
+            </a:r>
+          </a:p>
+          <a:p>
+            <a:pPr lvl="0"/>
+            <a:r>
+              <a:rPr/>
+              <a:t>A grounded, feasible new approach</a:t>
+            </a:r>
+          </a:p>
+          <a:p>
+            <a:pPr lvl="0" indent="0" marL="0">
+              <a:buNone/>
+            </a:pPr>
+            <a:r>
+              <a:rPr/>
+              <a:t>✅ Accomplished:</a:t>
+            </a:r>
+          </a:p>
+          <a:p>
+            <a:pPr lvl="0"/>
+            <a:r>
+              <a:rPr/>
+              <a:t>Architecture and direction redesigned</a:t>
+            </a:r>
+          </a:p>
+          <a:p>
+            <a:pPr lvl="0"/>
+            <a:r>
+              <a:rPr/>
+              <a:t>Demo + repo available:</a:t>
+            </a:r>
+          </a:p>
+          <a:p>
+            <a:pPr lvl="1"/>
+            <a:r>
+              <a:rPr/>
+              <a:t>GitHub</a:t>
+            </a:r>
+          </a:p>
+          <a:p>
+            <a:pPr lvl="1"/>
+            <a:r>
+              <a:rPr/>
+              <a:t>Demo</a:t>
+            </a:r>
+          </a:p>
+          <a:p>
+            <a:pPr lvl="0" indent="0" marL="0">
+              <a:buNone/>
+            </a:pPr>
+            <a:r>
+              <a:rPr/>
+              <a:t>::: ::: {.column width=“50%”}</a:t>
+            </a:r>
+          </a:p>
+          <a:p>
+            <a:pPr lvl="0" indent="0" marL="0">
+              <a:buNone/>
+            </a:pPr>
+            <a:r>
+              <a:rPr/>
+              <a:t>🚀 Next Steps:</a:t>
+            </a:r>
+          </a:p>
+          <a:p>
+            <a:pPr lvl="0"/>
+            <a:r>
+              <a:rPr/>
+              <a:t>Greenlight to begin ideation</a:t>
+            </a:r>
+          </a:p>
+          <a:p>
+            <a:pPr lvl="0"/>
+            <a:r>
+              <a:rPr/>
+              <a:t>Hours allocated for focused development</a:t>
+            </a:r>
+          </a:p>
+          <a:p>
+            <a:pPr lvl="0"/>
+            <a:r>
+              <a:rPr/>
+              <a:t>Permission to form a dedicated Scrum team</a:t>
+            </a:r>
+          </a:p>
+          <a:p>
+            <a:pPr lvl="0" indent="0" marL="0">
+              <a:buNone/>
+            </a:pPr>
+            <a:r>
+              <a:rPr/>
+              <a:t>🆘 Help Needed:</a:t>
+            </a:r>
+          </a:p>
+          <a:p>
+            <a:pPr lvl="0"/>
+            <a:r>
+              <a:rPr/>
+              <a:t>Approval to bring in trusted external contributors (free)</a:t>
+            </a:r>
+          </a:p>
+          <a:p>
+            <a:pPr lvl="0"/>
+            <a:r>
+              <a:rPr/>
+              <a:t>Spin this off as its own initiative (KvK, domain, mandate)</a:t>
+            </a:r>
+          </a:p>
+          <a:p>
+            <a:pPr lvl="0"/>
+            <a:r>
+              <a:rPr/>
+              <a:t>Budget (&lt; €5K) for prototyping and infrastructure</a:t>
+            </a:r>
+          </a:p>
+          <a:p>
+            <a:pPr lvl="0"/>
+            <a:r>
+              <a:rPr/>
+              <a:t>Space for experimentation with external partners</a:t>
+            </a:r>
+          </a:p>
+          <a:p>
+            <a:pPr lvl="0" indent="0" marL="0">
+              <a:buNone/>
+            </a:pPr>
+            <a:r>
+              <a:rPr/>
+              <a:t>::: ::::::::::::::</a:t>
             </a:r>
           </a:p>
         </p:txBody>
@@ -5652,7 +5917,7 @@
           <p:cNvPr id="2" name="Title 1">
             <a:extLst>
               <a:ext uri="{FF2B5EF4-FFF2-40B4-BE49-F238E27FC236}">
-                <a16:creationId xmlns:a16="http://schemas.microsoft.com/office/drawing/2014/main" id="{DD9B8E45-0772-954C-8D4B-6E6808DFEDED}"/>
+                <a16:creationId xmlns:a16="http://schemas.microsoft.com/office/drawing/2014/main" id="{2ECFDBC1-527D-3041-984A-EF5E7E9B7495}"/>
               </a:ext>
             </a:extLst>
           </p:cNvPr>
@@ -5681,7 +5946,7 @@
             </a:pPr>
             <a:r>
               <a:rPr/>
-              <a:t>9. Project Proposal – ClearPaper</a:t>
+              <a:t>7. Experimental Tool Testing – AI Scientist, Far.AI</a:t>
             </a:r>
           </a:p>
         </p:txBody>
@@ -5691,15 +5956,15 @@
           <p:cNvPr id="3" name="Content Placeholder 2">
             <a:extLst>
               <a:ext uri="{FF2B5EF4-FFF2-40B4-BE49-F238E27FC236}">
-                <a16:creationId xmlns:a16="http://schemas.microsoft.com/office/drawing/2014/main" id="{A4EB24F9-04F1-C843-9D71-56C5C024552B}"/>
-              </a:ext>
-            </a:extLst>
-          </p:cNvPr>
-          <p:cNvSpPr>
-            <a:spLocks noGrp="1"/>
-          </p:cNvSpPr>
-          <p:nvPr>
-            <p:ph idx="1"/>
+                <a16:creationId xmlns:a16="http://schemas.microsoft.com/office/drawing/2014/main" id="{63FA7BF1-44B1-744C-AB68-4BB0A6A5977E}"/>
+              </a:ext>
+            </a:extLst>
+          </p:cNvPr>
+          <p:cNvSpPr>
+            <a:spLocks noGrp="1"/>
+          </p:cNvSpPr>
+          <p:nvPr>
+            <p:ph idx="1" sz="half"/>
           </p:nvPr>
         </p:nvSpPr>
         <p:spPr/>
@@ -5712,73 +5977,159 @@
             </a:pPr>
             <a:r>
               <a:rPr/>
-              <a:t>Goal: Create practical, standardized templates to help cooperatives, importers, and other actors comply with EU sustainability laws (CSRD, CSDDD, EUDR).</a:t>
-            </a:r>
-          </a:p>
-          <a:p>
-            <a:pPr lvl="0" indent="0" marL="0">
-              <a:buNone/>
-            </a:pPr>
-            <a:r>
-              <a:rPr/>
-              <a:t>How It Works: Each template would: - Be directly linked to specific EU legal clauses</a:t>
+              <a:t>🔬 Goal:</a:t>
             </a:r>
             <a:br/>
             <a:r>
               <a:rPr/>
-              <a:t>- Come in Word, LaTeX, and JSON formats</a:t>
+              <a:t>Explore cutting-edge AI tools that support scientific workflows — including multi-step reasoning and automated experimentation.</a:t>
+            </a:r>
+          </a:p>
+          <a:p>
+            <a:pPr lvl="0" indent="0" marL="0">
+              <a:buNone/>
+            </a:pPr>
+            <a:r>
+              <a:rPr/>
+              <a:t>🌐 Why:</a:t>
+            </a:r>
+          </a:p>
+          <a:p>
+            <a:pPr lvl="0"/>
+            <a:r>
+              <a:rPr/>
+              <a:t>Keep Windesheim connected to frontier AI developments</a:t>
+            </a:r>
+          </a:p>
+          <a:p>
+            <a:pPr lvl="0"/>
+            <a:r>
+              <a:rPr/>
+              <a:t>Investigate tools that can:</a:t>
+            </a:r>
+          </a:p>
+          <a:p>
+            <a:pPr lvl="1"/>
+            <a:r>
+              <a:rPr/>
+              <a:t>Simulate cyber attacks</a:t>
+            </a:r>
+          </a:p>
+          <a:p>
+            <a:pPr lvl="1"/>
+            <a:r>
+              <a:rPr/>
+              <a:t>Assist in generating PhD-level content</a:t>
+            </a:r>
+          </a:p>
+          <a:p>
+            <a:pPr lvl="1"/>
+            <a:r>
+              <a:rPr/>
+              <a:t>Automate complex reasoning chains</a:t>
             </a:r>
             <a:br/>
             <a:r>
               <a:rPr/>
-              <a:t>- Adapt to national implementations and local languages</a:t>
-            </a:r>
-            <a:br/>
-            <a:r>
-              <a:rPr/>
-              <a:t>- Optionally integrate with tools like AgUnity for semi-automated input</a:t>
-            </a:r>
-          </a:p>
-          <a:p>
-            <a:pPr lvl="0" indent="0" marL="0">
-              <a:buNone/>
-            </a:pPr>
-            <a:r>
-              <a:rPr/>
-              <a:t>Why It Matters: - There’s no common definition of what “compliant documentation” looks like</a:t>
-            </a:r>
-            <a:br/>
-            <a:r>
-              <a:rPr/>
-              <a:t>- This creates risk for importers and barriers for smallholders</a:t>
-            </a:r>
-            <a:br/>
-            <a:r>
-              <a:rPr/>
-              <a:t>- ClearPaper provides a transparent, usable foundation for scalable compliance</a:t>
-            </a:r>
-          </a:p>
-          <a:p>
-            <a:pPr lvl="0" indent="0" marL="0">
-              <a:buNone/>
-            </a:pPr>
-            <a:r>
-              <a:rPr/>
-              <a:t>Current Status: - Begun legal mapping and validation discussions with Windesheim and SCF NICE</a:t>
-            </a:r>
-          </a:p>
-          <a:p>
-            <a:pPr lvl="0" indent="0" marL="0">
-              <a:buNone/>
-            </a:pPr>
-            <a:r>
-              <a:rPr/>
-              <a:t>Help Needed: - Collect feedback to shape a strong grant proposal</a:t>
-            </a:r>
-            <a:br/>
-            <a:r>
-              <a:rPr/>
-              <a:t>- Turn this into a fundable project — give us a grant writer!</a:t>
+              <a:t>These tools may redefine how we approach research workflows.</a:t>
+            </a:r>
+          </a:p>
+          <a:p>
+            <a:pPr lvl="0" indent="0" marL="0">
+              <a:buNone/>
+            </a:pPr>
+            <a:r>
+              <a:rPr/>
+              <a:t>✅ Accomplished:</a:t>
+            </a:r>
+          </a:p>
+          <a:p>
+            <a:pPr lvl="0"/>
+            <a:r>
+              <a:rPr/>
+              <a:t>Reviewed AI Scientist and Far.AI initiatives</a:t>
+            </a:r>
+          </a:p>
+          <a:p>
+            <a:pPr lvl="0"/>
+            <a:r>
+              <a:rPr/>
+              <a:t>Identified high-potential capabilities</a:t>
+            </a:r>
+          </a:p>
+          <a:p>
+            <a:pPr lvl="0"/>
+            <a:r>
+              <a:rPr/>
+              <a:t>Repository bookmarked:</a:t>
+            </a:r>
+          </a:p>
+          <a:p>
+            <a:pPr lvl="1"/>
+            <a:r>
+              <a:rPr/>
+              <a:t>GitHub – AI Scientist (aci)</a:t>
+            </a:r>
+          </a:p>
+        </p:txBody>
+      </p:sp>
+      <p:sp>
+        <p:nvSpPr>
+          <p:cNvPr id="4" name="Content Placeholder 3">
+            <a:extLst>
+              <a:ext uri="{FF2B5EF4-FFF2-40B4-BE49-F238E27FC236}">
+                <a16:creationId xmlns:a16="http://schemas.microsoft.com/office/drawing/2014/main" id="{3B974A49-6A1E-2F48-B419-02B0A17B9692}"/>
+              </a:ext>
+            </a:extLst>
+          </p:cNvPr>
+          <p:cNvSpPr>
+            <a:spLocks noGrp="1"/>
+          </p:cNvSpPr>
+          <p:nvPr>
+            <p:ph idx="2" sz="half"/>
+          </p:nvPr>
+        </p:nvSpPr>
+        <p:spPr/>
+        <p:txBody>
+          <a:bodyPr/>
+          <a:lstStyle/>
+          <a:p>
+            <a:pPr lvl="0" indent="0" marL="0">
+              <a:buNone/>
+            </a:pPr>
+            <a:r>
+              <a:rPr/>
+              <a:t>🚀 Next Steps:</a:t>
+            </a:r>
+          </a:p>
+          <a:p>
+            <a:pPr lvl="0"/>
+            <a:r>
+              <a:rPr/>
+              <a:t>Test 3 key tools to assess research potential</a:t>
+            </a:r>
+          </a:p>
+          <a:p>
+            <a:pPr lvl="0"/>
+            <a:r>
+              <a:rPr/>
+              <a:t>Identify barriers, limitations, and integration opportunities</a:t>
+            </a:r>
+          </a:p>
+          <a:p>
+            <a:pPr lvl="0" indent="0" marL="0">
+              <a:buNone/>
+            </a:pPr>
+            <a:r>
+              <a:rPr/>
+              <a:t>🆘 Help Needed:</a:t>
+            </a:r>
+          </a:p>
+          <a:p>
+            <a:pPr lvl="0"/>
+            <a:r>
+              <a:rPr/>
+              <a:t>Budget for tokens to properly test and evaluate the tools</a:t>
             </a:r>
           </a:p>
         </p:txBody>
@@ -5839,7 +6190,701 @@
             </a:pPr>
             <a:r>
               <a:rPr/>
-              <a:t>10. Key Collaborations</a:t>
+              <a:t>8. Project Proposal – ClearRoots</a:t>
+            </a:r>
+          </a:p>
+        </p:txBody>
+      </p:sp>
+      <p:sp>
+        <p:nvSpPr>
+          <p:cNvPr id="3" name="Content Placeholder 2">
+            <a:extLst>
+              <a:ext uri="{FF2B5EF4-FFF2-40B4-BE49-F238E27FC236}">
+                <a16:creationId xmlns:a16="http://schemas.microsoft.com/office/drawing/2014/main" id="{A4EB24F9-04F1-C843-9D71-56C5C024552B}"/>
+              </a:ext>
+            </a:extLst>
+          </p:cNvPr>
+          <p:cNvSpPr>
+            <a:spLocks noGrp="1"/>
+          </p:cNvSpPr>
+          <p:nvPr>
+            <p:ph idx="1"/>
+          </p:nvPr>
+        </p:nvSpPr>
+        <p:spPr/>
+        <p:txBody>
+          <a:bodyPr/>
+          <a:lstStyle/>
+          <a:p>
+            <a:pPr lvl="0" indent="0" marL="0">
+              <a:buNone/>
+            </a:pPr>
+            <a:r>
+              <a:rPr/>
+              <a:t>Examples: - </a:t>
+            </a:r>
+            <a:r>
+              <a:rPr>
+                <a:hlinkClick r:id="rId3"/>
+              </a:rPr>
+              <a:t>VCH-ClearRoots</a:t>
+            </a:r>
+            <a:r>
+              <a:rPr/>
+              <a:t> :::::::::::::: {.columns} ::: {.column width=“50%”}</a:t>
+            </a:r>
+          </a:p>
+          <a:p>
+            <a:pPr lvl="0" indent="0" marL="0">
+              <a:buNone/>
+            </a:pPr>
+            <a:r>
+              <a:rPr/>
+              <a:t>🎯 Goal:</a:t>
+            </a:r>
+            <a:br/>
+            <a:r>
+              <a:rPr/>
+              <a:t>Build a digital platform to help smallholder cooperatives and EU SME importers comply with EU sustainability laws (CSRD, CSDDD, EUDR).</a:t>
+            </a:r>
+          </a:p>
+          <a:p>
+            <a:pPr lvl="0" indent="0" marL="0">
+              <a:buNone/>
+            </a:pPr>
+            <a:r>
+              <a:rPr/>
+              <a:t>⚙️ How It Works:</a:t>
+            </a:r>
+          </a:p>
+          <a:p>
+            <a:pPr lvl="0"/>
+            <a:r>
+              <a:rPr/>
+              <a:t>Data collected via a multilingual, offline-capable mobile app</a:t>
+            </a:r>
+          </a:p>
+          <a:p>
+            <a:pPr lvl="0"/>
+            <a:r>
+              <a:rPr/>
+              <a:t>Time-stamped data stored on AgUnity’s blockchain</a:t>
+            </a:r>
+          </a:p>
+          <a:p>
+            <a:pPr lvl="0"/>
+            <a:r>
+              <a:rPr/>
+              <a:t>App guides users to complete EU-aligned documentation</a:t>
+            </a:r>
+          </a:p>
+          <a:p>
+            <a:pPr lvl="0"/>
+            <a:r>
+              <a:rPr/>
+              <a:t>Importers receive ready-to-submit compliance dossiers</a:t>
+            </a:r>
+          </a:p>
+          <a:p>
+            <a:pPr lvl="0" indent="0" marL="0">
+              <a:buNone/>
+            </a:pPr>
+            <a:r>
+              <a:rPr/>
+              <a:t>📍 Status:</a:t>
+            </a:r>
+          </a:p>
+          <a:p>
+            <a:pPr lvl="0"/>
+            <a:r>
+              <a:rPr/>
+              <a:t>Core logic and user roles drafted</a:t>
+            </a:r>
+          </a:p>
+          <a:p>
+            <a:pPr lvl="0"/>
+            <a:r>
+              <a:rPr/>
+              <a:t>Documentation flow + pilot framework outlined</a:t>
+            </a:r>
+          </a:p>
+          <a:p>
+            <a:pPr lvl="0"/>
+            <a:r>
+              <a:rPr/>
+              <a:t>Initial partners: AgUnity, Windesheim, SCF NICE</a:t>
+            </a:r>
+          </a:p>
+          <a:p>
+            <a:pPr lvl="0"/>
+            <a:r>
+              <a:rPr/>
+              <a:t>Pitch deck and 1-pager in first draft</a:t>
+            </a:r>
+          </a:p>
+          <a:p>
+            <a:pPr lvl="0" indent="0" marL="0">
+              <a:buNone/>
+            </a:pPr>
+            <a:r>
+              <a:rPr/>
+              <a:t>::: ::: {.column width=“50%”}</a:t>
+            </a:r>
+          </a:p>
+          <a:p>
+            <a:pPr lvl="0" indent="0" marL="0">
+              <a:buNone/>
+            </a:pPr>
+            <a:r>
+              <a:rPr/>
+              <a:t>🌍 Why It Matters:</a:t>
+            </a:r>
+          </a:p>
+          <a:p>
+            <a:pPr lvl="0"/>
+            <a:r>
+              <a:rPr/>
+              <a:t>EU laws demand documentation smallholders can’t provide</a:t>
+            </a:r>
+          </a:p>
+          <a:p>
+            <a:pPr lvl="0"/>
+            <a:r>
+              <a:rPr/>
+              <a:t>Importers lack accessible tools for compliance</a:t>
+            </a:r>
+          </a:p>
+          <a:p>
+            <a:pPr lvl="0"/>
+            <a:r>
+              <a:rPr/>
+              <a:t>This platform bridges the gap — without exclusion or greenwashing</a:t>
+            </a:r>
+          </a:p>
+          <a:p>
+            <a:pPr lvl="0" indent="0" marL="0">
+              <a:buNone/>
+            </a:pPr>
+            <a:r>
+              <a:rPr/>
+              <a:t>🆘 Help Needed:</a:t>
+            </a:r>
+          </a:p>
+          <a:p>
+            <a:pPr lvl="0"/>
+            <a:r>
+              <a:rPr/>
+              <a:t>Funding or co-development support</a:t>
+            </a:r>
+          </a:p>
+          <a:p>
+            <a:pPr lvl="0"/>
+            <a:r>
+              <a:rPr/>
+              <a:t>Help turning this into a grant proposal</a:t>
+            </a:r>
+          </a:p>
+          <a:p>
+            <a:pPr lvl="0"/>
+            <a:r>
+              <a:rPr/>
+              <a:t>A grant writer or partner to help push this forward</a:t>
+            </a:r>
+          </a:p>
+          <a:p>
+            <a:pPr lvl="0" indent="0" marL="0">
+              <a:buNone/>
+            </a:pPr>
+            <a:r>
+              <a:rPr/>
+              <a:t>::: ::::::::::::::</a:t>
+            </a:r>
+          </a:p>
+        </p:txBody>
+      </p:sp>
+    </p:spTree>
+  </p:cSld>
+</p:sld>
+</file>
+
+<file path=ppt/slides/slide15.xml><?xml version="1.0" encoding="utf-8"?>
+<p:sld xmlns:a="http://schemas.openxmlformats.org/drawingml/2006/main" xmlns:r="http://schemas.openxmlformats.org/officeDocument/2006/relationships" xmlns:p="http://schemas.openxmlformats.org/presentationml/2006/main">
+  <p:cSld>
+    <p:spTree>
+      <p:nvGrpSpPr>
+        <p:cNvPr id="1" name=""/>
+        <p:cNvGrpSpPr/>
+        <p:nvPr/>
+      </p:nvGrpSpPr>
+      <p:grpSpPr>
+        <a:xfrm>
+          <a:off x="0" y="0"/>
+          <a:ext cx="0" cy="0"/>
+          <a:chOff x="0" y="0"/>
+          <a:chExt cx="0" cy="0"/>
+        </a:xfrm>
+      </p:grpSpPr>
+      <p:sp>
+        <p:nvSpPr>
+          <p:cNvPr id="2" name="Title 1">
+            <a:extLst>
+              <a:ext uri="{FF2B5EF4-FFF2-40B4-BE49-F238E27FC236}">
+                <a16:creationId xmlns:a16="http://schemas.microsoft.com/office/drawing/2014/main" id="{DD9B8E45-0772-954C-8D4B-6E6808DFEDED}"/>
+              </a:ext>
+            </a:extLst>
+          </p:cNvPr>
+          <p:cNvSpPr>
+            <a:spLocks noGrp="1"/>
+          </p:cNvSpPr>
+          <p:nvPr>
+            <p:ph type="title"/>
+          </p:nvPr>
+        </p:nvSpPr>
+        <p:spPr>
+          <a:xfrm>
+            <a:off x="838200" y="365129"/>
+            <a:ext cx="10515600" cy="1325563"/>
+          </a:xfrm>
+          <a:prstGeom prst="rect">
+            <a:avLst/>
+          </a:prstGeom>
+        </p:spPr>
+        <p:txBody>
+          <a:bodyPr/>
+          <a:lstStyle/>
+          <a:p>
+            <a:pPr lvl="0" indent="0" marL="0">
+              <a:buNone/>
+            </a:pPr>
+            <a:r>
+              <a:rPr/>
+              <a:t>9. Project Proposal – ClearPaper</a:t>
+            </a:r>
+          </a:p>
+        </p:txBody>
+      </p:sp>
+      <p:sp>
+        <p:nvSpPr>
+          <p:cNvPr id="3" name="Content Placeholder 2">
+            <a:extLst>
+              <a:ext uri="{FF2B5EF4-FFF2-40B4-BE49-F238E27FC236}">
+                <a16:creationId xmlns:a16="http://schemas.microsoft.com/office/drawing/2014/main" id="{A4EB24F9-04F1-C843-9D71-56C5C024552B}"/>
+              </a:ext>
+            </a:extLst>
+          </p:cNvPr>
+          <p:cNvSpPr>
+            <a:spLocks noGrp="1"/>
+          </p:cNvSpPr>
+          <p:nvPr>
+            <p:ph idx="1"/>
+          </p:nvPr>
+        </p:nvSpPr>
+        <p:spPr/>
+        <p:txBody>
+          <a:bodyPr/>
+          <a:lstStyle/>
+          <a:p>
+            <a:pPr lvl="0" indent="0" marL="0">
+              <a:buNone/>
+            </a:pPr>
+            <a:r>
+              <a:rPr/>
+              <a:t>Examples: - </a:t>
+            </a:r>
+            <a:r>
+              <a:rPr>
+                <a:hlinkClick r:id="rId3"/>
+              </a:rPr>
+              <a:t>VCH-ClearRoots</a:t>
+            </a:r>
+            <a:r>
+              <a:rPr/>
+              <a:t> :::::::::::::: {.columns} ::: {.column width=“50%”}</a:t>
+            </a:r>
+          </a:p>
+          <a:p>
+            <a:pPr lvl="0" indent="0" marL="0">
+              <a:buNone/>
+            </a:pPr>
+            <a:r>
+              <a:rPr/>
+              <a:t>📄 Goal:</a:t>
+            </a:r>
+            <a:br/>
+            <a:r>
+              <a:rPr/>
+              <a:t>Create practical, standardized templates to help cooperatives, importers, and other actors comply with EU sustainability laws (CSRD, CSDDD, EUDR).</a:t>
+            </a:r>
+          </a:p>
+          <a:p>
+            <a:pPr lvl="0" indent="0" marL="0">
+              <a:buNone/>
+            </a:pPr>
+            <a:r>
+              <a:rPr/>
+              <a:t>🌍 Why It Matters:</a:t>
+            </a:r>
+          </a:p>
+          <a:p>
+            <a:pPr lvl="0"/>
+            <a:r>
+              <a:rPr/>
+              <a:t>No shared definition of “compliant documentation”</a:t>
+            </a:r>
+          </a:p>
+          <a:p>
+            <a:pPr lvl="0"/>
+            <a:r>
+              <a:rPr/>
+              <a:t>Uncertainty for importers</a:t>
+            </a:r>
+          </a:p>
+          <a:p>
+            <a:pPr lvl="0"/>
+            <a:r>
+              <a:rPr/>
+              <a:t>Exclusion of smallholders without expert support</a:t>
+            </a:r>
+          </a:p>
+          <a:p>
+            <a:pPr lvl="0"/>
+            <a:r>
+              <a:rPr/>
+              <a:t>ClearPaper enables trustable, scalable compliance</a:t>
+            </a:r>
+          </a:p>
+          <a:p>
+            <a:pPr lvl="0" indent="0" marL="0">
+              <a:buNone/>
+            </a:pPr>
+            <a:r>
+              <a:rPr/>
+              <a:t>📍 Current Status:</a:t>
+            </a:r>
+          </a:p>
+          <a:p>
+            <a:pPr lvl="0"/>
+            <a:r>
+              <a:rPr/>
+              <a:t>Legal mapping and validation discussions started with Windesheim and SCF NICE</a:t>
+            </a:r>
+          </a:p>
+          <a:p>
+            <a:pPr lvl="0" indent="0" marL="0">
+              <a:buNone/>
+            </a:pPr>
+            <a:r>
+              <a:rPr/>
+              <a:t>::: ::: {.column width=“50%”}</a:t>
+            </a:r>
+          </a:p>
+          <a:p>
+            <a:pPr lvl="0" indent="0" marL="0">
+              <a:buNone/>
+            </a:pPr>
+            <a:r>
+              <a:rPr/>
+              <a:t>🛠️ How It Works:</a:t>
+            </a:r>
+            <a:br/>
+            <a:r>
+              <a:rPr/>
+              <a:t>Each template would:</a:t>
+            </a:r>
+          </a:p>
+          <a:p>
+            <a:pPr lvl="0"/>
+            <a:r>
+              <a:rPr/>
+              <a:t>Link directly to relevant EU legal clauses</a:t>
+            </a:r>
+          </a:p>
+          <a:p>
+            <a:pPr lvl="0"/>
+            <a:r>
+              <a:rPr/>
+              <a:t>Be available in Word, LaTeX, and JSON formats</a:t>
+            </a:r>
+          </a:p>
+          <a:p>
+            <a:pPr lvl="0"/>
+            <a:r>
+              <a:rPr/>
+              <a:t>Adapt to national implementations and local languages</a:t>
+            </a:r>
+          </a:p>
+          <a:p>
+            <a:pPr lvl="0"/>
+            <a:r>
+              <a:rPr/>
+              <a:t>Optionally integrate with platforms like AgUnity</a:t>
+            </a:r>
+          </a:p>
+          <a:p>
+            <a:pPr lvl="0" indent="0" marL="0">
+              <a:buNone/>
+            </a:pPr>
+            <a:r>
+              <a:rPr/>
+              <a:t>🆘 Help Needed:</a:t>
+            </a:r>
+          </a:p>
+          <a:p>
+            <a:pPr lvl="0"/>
+            <a:r>
+              <a:rPr/>
+              <a:t>Collect feedback to strengthen a grant proposal</a:t>
+            </a:r>
+          </a:p>
+          <a:p>
+            <a:pPr lvl="0"/>
+            <a:r>
+              <a:rPr/>
+              <a:t>Support turning this into a fundable project</a:t>
+            </a:r>
+          </a:p>
+          <a:p>
+            <a:pPr lvl="0"/>
+            <a:r>
+              <a:rPr/>
+              <a:t>We need a grant writer</a:t>
+            </a:r>
+          </a:p>
+          <a:p>
+            <a:pPr lvl="0" indent="0" marL="0">
+              <a:buNone/>
+            </a:pPr>
+            <a:r>
+              <a:rPr/>
+              <a:t>::: ::::::::::::::</a:t>
+            </a:r>
+          </a:p>
+        </p:txBody>
+      </p:sp>
+    </p:spTree>
+  </p:cSld>
+</p:sld>
+</file>
+
+<file path=ppt/slides/slide16.xml><?xml version="1.0" encoding="utf-8"?>
+<p:sld xmlns:a="http://schemas.openxmlformats.org/drawingml/2006/main" xmlns:r="http://schemas.openxmlformats.org/officeDocument/2006/relationships" xmlns:p="http://schemas.openxmlformats.org/presentationml/2006/main">
+  <p:cSld>
+    <p:spTree>
+      <p:nvGrpSpPr>
+        <p:cNvPr id="1" name=""/>
+        <p:cNvGrpSpPr/>
+        <p:nvPr/>
+      </p:nvGrpSpPr>
+      <p:grpSpPr>
+        <a:xfrm>
+          <a:off x="0" y="0"/>
+          <a:ext cx="0" cy="0"/>
+          <a:chOff x="0" y="0"/>
+          <a:chExt cx="0" cy="0"/>
+        </a:xfrm>
+      </p:grpSpPr>
+      <p:sp>
+        <p:nvSpPr>
+          <p:cNvPr id="2" name="Title 1">
+            <a:extLst>
+              <a:ext uri="{FF2B5EF4-FFF2-40B4-BE49-F238E27FC236}">
+                <a16:creationId xmlns:a16="http://schemas.microsoft.com/office/drawing/2014/main" id="{2ECFDBC1-527D-3041-984A-EF5E7E9B7495}"/>
+              </a:ext>
+            </a:extLst>
+          </p:cNvPr>
+          <p:cNvSpPr>
+            <a:spLocks noGrp="1"/>
+          </p:cNvSpPr>
+          <p:nvPr>
+            <p:ph type="title"/>
+          </p:nvPr>
+        </p:nvSpPr>
+        <p:spPr>
+          <a:xfrm>
+            <a:off x="838200" y="365129"/>
+            <a:ext cx="10515600" cy="1325563"/>
+          </a:xfrm>
+          <a:prstGeom prst="rect">
+            <a:avLst/>
+          </a:prstGeom>
+        </p:spPr>
+        <p:txBody>
+          <a:bodyPr/>
+          <a:lstStyle/>
+          <a:p>
+            <a:pPr lvl="0" indent="0" marL="0">
+              <a:buNone/>
+            </a:pPr>
+            <a:r>
+              <a:rPr/>
+              <a:t>Bi-Ronald: Automated Survey Reporting Platform</a:t>
+            </a:r>
+          </a:p>
+        </p:txBody>
+      </p:sp>
+      <p:sp>
+        <p:nvSpPr>
+          <p:cNvPr id="3" name="Content Placeholder 2">
+            <a:extLst>
+              <a:ext uri="{FF2B5EF4-FFF2-40B4-BE49-F238E27FC236}">
+                <a16:creationId xmlns:a16="http://schemas.microsoft.com/office/drawing/2014/main" id="{63FA7BF1-44B1-744C-AB68-4BB0A6A5977E}"/>
+              </a:ext>
+            </a:extLst>
+          </p:cNvPr>
+          <p:cNvSpPr>
+            <a:spLocks noGrp="1"/>
+          </p:cNvSpPr>
+          <p:nvPr>
+            <p:ph idx="1" sz="half"/>
+          </p:nvPr>
+        </p:nvSpPr>
+        <p:spPr/>
+        <p:txBody>
+          <a:bodyPr/>
+          <a:lstStyle/>
+          <a:p>
+            <a:pPr lvl="0" indent="0" marL="0">
+              <a:buNone/>
+            </a:pPr>
+            <a:r>
+              <a:rPr/>
+              <a:t>🎯 Purpose:</a:t>
+            </a:r>
+            <a:br/>
+            <a:r>
+              <a:rPr/>
+              <a:t>Streamline survey workflows by automating response collection, analysis, and personalized report generation using open-source tools on self-hosted infrastructure.</a:t>
+            </a:r>
+          </a:p>
+          <a:p>
+            <a:pPr lvl="0" indent="0" marL="0">
+              <a:buNone/>
+            </a:pPr>
+            <a:r>
+              <a:rPr/>
+              <a:t>🛠️ How It Works:</a:t>
+            </a:r>
+            <a:br/>
+            <a:r>
+              <a:rPr/>
+              <a:t>- Participants complete a multi-step survey. - Responses are securely stored in a local database. - Automated workflows generate customized reports (PDF/HTML). - Reports are emailed to participants. - Data is prepared for structured analysis via dashboards or custom analytics.</a:t>
+            </a:r>
+          </a:p>
+        </p:txBody>
+      </p:sp>
+      <p:sp>
+        <p:nvSpPr>
+          <p:cNvPr id="4" name="Content Placeholder 3">
+            <a:extLst>
+              <a:ext uri="{FF2B5EF4-FFF2-40B4-BE49-F238E27FC236}">
+                <a16:creationId xmlns:a16="http://schemas.microsoft.com/office/drawing/2014/main" id="{3B974A49-6A1E-2F48-B419-02B0A17B9692}"/>
+              </a:ext>
+            </a:extLst>
+          </p:cNvPr>
+          <p:cNvSpPr>
+            <a:spLocks noGrp="1"/>
+          </p:cNvSpPr>
+          <p:nvPr>
+            <p:ph idx="2" sz="half"/>
+          </p:nvPr>
+        </p:nvSpPr>
+        <p:spPr/>
+        <p:txBody>
+          <a:bodyPr/>
+          <a:lstStyle/>
+          <a:p>
+            <a:pPr lvl="0" indent="0" marL="0">
+              <a:buNone/>
+            </a:pPr>
+            <a:r>
+              <a:rPr/>
+              <a:t>💡 Why It Matters:</a:t>
+            </a:r>
+            <a:br/>
+            <a:r>
+              <a:rPr/>
+              <a:t>- Eliminates manual data processing and report generation. - Ensures data privacy by avoiding external cloud services. - Enhances efficiency in research and educational settings.</a:t>
+            </a:r>
+          </a:p>
+          <a:p>
+            <a:pPr lvl="0" indent="0" marL="0">
+              <a:buNone/>
+            </a:pPr>
+            <a:r>
+              <a:rPr/>
+              <a:t>🔗 Repository:</a:t>
+            </a:r>
+            <a:br/>
+            <a:r>
+              <a:rPr/>
+              <a:t>- </a:t>
+            </a:r>
+            <a:r>
+              <a:rPr>
+                <a:hlinkClick r:id="rId3"/>
+              </a:rPr>
+              <a:t>GitHub – Bi-Ronald</a:t>
+            </a:r>
+          </a:p>
+        </p:txBody>
+      </p:sp>
+    </p:spTree>
+  </p:cSld>
+</p:sld>
+</file>
+
+<file path=ppt/slides/slide17.xml><?xml version="1.0" encoding="utf-8"?>
+<p:sld xmlns:a="http://schemas.openxmlformats.org/drawingml/2006/main" xmlns:r="http://schemas.openxmlformats.org/officeDocument/2006/relationships" xmlns:p="http://schemas.openxmlformats.org/presentationml/2006/main">
+  <p:cSld>
+    <p:spTree>
+      <p:nvGrpSpPr>
+        <p:cNvPr id="1" name=""/>
+        <p:cNvGrpSpPr/>
+        <p:nvPr/>
+      </p:nvGrpSpPr>
+      <p:grpSpPr>
+        <a:xfrm>
+          <a:off x="0" y="0"/>
+          <a:ext cx="0" cy="0"/>
+          <a:chOff x="0" y="0"/>
+          <a:chExt cx="0" cy="0"/>
+        </a:xfrm>
+      </p:grpSpPr>
+      <p:sp>
+        <p:nvSpPr>
+          <p:cNvPr id="2" name="Title 1">
+            <a:extLst>
+              <a:ext uri="{FF2B5EF4-FFF2-40B4-BE49-F238E27FC236}">
+                <a16:creationId xmlns:a16="http://schemas.microsoft.com/office/drawing/2014/main" id="{DD9B8E45-0772-954C-8D4B-6E6808DFEDED}"/>
+              </a:ext>
+            </a:extLst>
+          </p:cNvPr>
+          <p:cNvSpPr>
+            <a:spLocks noGrp="1"/>
+          </p:cNvSpPr>
+          <p:nvPr>
+            <p:ph type="title"/>
+          </p:nvPr>
+        </p:nvSpPr>
+        <p:spPr>
+          <a:xfrm>
+            <a:off x="838200" y="365129"/>
+            <a:ext cx="10515600" cy="1325563"/>
+          </a:xfrm>
+          <a:prstGeom prst="rect">
+            <a:avLst/>
+          </a:prstGeom>
+        </p:spPr>
+        <p:txBody>
+          <a:bodyPr/>
+          <a:lstStyle/>
+          <a:p>
+            <a:pPr lvl="0" indent="0" marL="0">
+              <a:buNone/>
+            </a:pPr>
+            <a:r>
+              <a:rPr/>
+              <a:t>11. Key Collaborations</a:t>
             </a:r>
           </a:p>
         </p:txBody>
@@ -5935,39 +6980,104 @@
       </p:grpSpPr>
       <p:sp>
         <p:nvSpPr>
-          <p:cNvPr id="2" name="Title 1">
-            <a:extLst>
-              <a:ext uri="{FF2B5EF4-FFF2-40B4-BE49-F238E27FC236}">
-                <a16:creationId xmlns:a16="http://schemas.microsoft.com/office/drawing/2014/main" id="{FF6A6CB2-D1B6-B94A-84C1-83C65423C650}"/>
-              </a:ext>
-            </a:extLst>
-          </p:cNvPr>
-          <p:cNvSpPr>
-            <a:spLocks noGrp="1"/>
-          </p:cNvSpPr>
-          <p:nvPr>
-            <p:ph type="title"/>
-          </p:nvPr>
-        </p:nvSpPr>
-        <p:spPr>
-          <a:xfrm>
-            <a:off x="831851" y="1709742"/>
-            <a:ext cx="10515600" cy="2852737"/>
-          </a:xfrm>
-          <a:prstGeom prst="rect">
-            <a:avLst/>
-          </a:prstGeom>
-        </p:spPr>
-        <p:txBody>
-          <a:bodyPr/>
-          <a:lstStyle/>
-          <a:p>
-            <a:pPr lvl="0" indent="0" marL="0">
-              <a:buNone/>
-            </a:pPr>
-            <a:r>
-              <a:rPr/>
+          <p:cNvPr id="3" name="Content Placeholder 2">
+            <a:extLst>
+              <a:ext uri="{FF2B5EF4-FFF2-40B4-BE49-F238E27FC236}">
+                <a16:creationId xmlns:a16="http://schemas.microsoft.com/office/drawing/2014/main" id="{63FA7BF1-44B1-744C-AB68-4BB0A6A5977E}"/>
+              </a:ext>
+            </a:extLst>
+          </p:cNvPr>
+          <p:cNvSpPr>
+            <a:spLocks noGrp="1"/>
+          </p:cNvSpPr>
+          <p:nvPr>
+            <p:ph idx="1" sz="half"/>
+          </p:nvPr>
+        </p:nvSpPr>
+        <p:spPr/>
+        <p:txBody>
+          <a:bodyPr/>
+          <a:lstStyle/>
+          <a:p>
+            <a:pPr lvl="0" indent="0" marL="0">
+              <a:spcBef>
+                <a:spcPts val="3000"/>
+              </a:spcBef>
+              <a:buNone/>
+            </a:pPr>
+            <a:r>
+              <a:rPr b="1"/>
               <a:t>Project Overview</a:t>
+            </a:r>
+          </a:p>
+        </p:txBody>
+      </p:sp>
+      <p:sp>
+        <p:nvSpPr>
+          <p:cNvPr id="4" name="Content Placeholder 3">
+            <a:extLst>
+              <a:ext uri="{FF2B5EF4-FFF2-40B4-BE49-F238E27FC236}">
+                <a16:creationId xmlns:a16="http://schemas.microsoft.com/office/drawing/2014/main" id="{3B974A49-6A1E-2F48-B419-02B0A17B9692}"/>
+              </a:ext>
+            </a:extLst>
+          </p:cNvPr>
+          <p:cNvSpPr>
+            <a:spLocks noGrp="1"/>
+          </p:cNvSpPr>
+          <p:nvPr>
+            <p:ph idx="2" sz="half"/>
+          </p:nvPr>
+        </p:nvSpPr>
+        <p:spPr/>
+        <p:txBody>
+          <a:bodyPr/>
+          <a:lstStyle/>
+          <a:p>
+            <a:pPr lvl="0" indent="0" marL="0">
+              <a:buNone/>
+            </a:pPr>
+            <a:r>
+              <a:rPr/>
+              <a:t>🧠 Skills &amp; What’s Working:</a:t>
+            </a:r>
+          </a:p>
+          <a:p>
+            <a:pPr lvl="0"/>
+            <a:r>
+              <a:rPr/>
+              <a:t>Full AI stack deployment (OpenWebUI, Qdrant, n8n)</a:t>
+            </a:r>
+            <a:br/>
+          </a:p>
+          <a:p>
+            <a:pPr lvl="0"/>
+            <a:r>
+              <a:rPr/>
+              <a:t>Reproducible R workflows (RStudio, Docker)</a:t>
+            </a:r>
+            <a:br/>
+          </a:p>
+          <a:p>
+            <a:pPr lvl="0"/>
+            <a:r>
+              <a:rPr/>
+              <a:t>Real-use workshops + mentorship</a:t>
+            </a:r>
+            <a:br/>
+          </a:p>
+          <a:p>
+            <a:pPr lvl="0"/>
+            <a:r>
+              <a:rPr/>
+              <a:t>Proposal writing and stakeholder engagement</a:t>
+            </a:r>
+            <a:br/>
+          </a:p>
+          <a:p>
+            <a:pPr lvl="0"/>
+            <a:r>
+              <a:rPr/>
+              <a:t>Active collaborations gaining traction</a:t>
             </a:r>
           </a:p>
         </p:txBody>
@@ -5999,7 +7109,7 @@
           <p:cNvPr id="2" name="Title 1">
             <a:extLst>
               <a:ext uri="{FF2B5EF4-FFF2-40B4-BE49-F238E27FC236}">
-                <a16:creationId xmlns:a16="http://schemas.microsoft.com/office/drawing/2014/main" id="{DD9B8E45-0772-954C-8D4B-6E6808DFEDED}"/>
+                <a16:creationId xmlns:a16="http://schemas.microsoft.com/office/drawing/2014/main" id="{2ECFDBC1-527D-3041-984A-EF5E7E9B7495}"/>
               </a:ext>
             </a:extLst>
           </p:cNvPr>
@@ -6029,6 +7139,151 @@
             <a:r>
               <a:rPr/>
               <a:t>Current Workstreams and Collaborations</a:t>
+            </a:r>
+          </a:p>
+        </p:txBody>
+      </p:sp>
+      <p:sp>
+        <p:nvSpPr>
+          <p:cNvPr id="3" name="Content Placeholder 2">
+            <a:extLst>
+              <a:ext uri="{FF2B5EF4-FFF2-40B4-BE49-F238E27FC236}">
+                <a16:creationId xmlns:a16="http://schemas.microsoft.com/office/drawing/2014/main" id="{63FA7BF1-44B1-744C-AB68-4BB0A6A5977E}"/>
+              </a:ext>
+            </a:extLst>
+          </p:cNvPr>
+          <p:cNvSpPr>
+            <a:spLocks noGrp="1"/>
+          </p:cNvSpPr>
+          <p:nvPr>
+            <p:ph idx="1" sz="half"/>
+          </p:nvPr>
+        </p:nvSpPr>
+        <p:spPr/>
+        <p:txBody>
+          <a:bodyPr/>
+          <a:lstStyle/>
+          <a:p>
+            <a:pPr lvl="0" indent="0" marL="0">
+              <a:buNone/>
+            </a:pPr>
+            <a:r>
+              <a:rPr/>
+              <a:t>🔧 Infrastructure:</a:t>
+            </a:r>
+            <a:br/>
+            <a:r>
+              <a:rPr/>
+              <a:t>- VCH LLM stack (OpenWebUI, Qdrant, n8n)</a:t>
+            </a:r>
+            <a:br/>
+            <a:r>
+              <a:rPr/>
+              <a:t>- DAT Linux for reproducible setups</a:t>
+            </a:r>
+            <a:br/>
+            <a:r>
+              <a:rPr/>
+              <a:t>- Nextcloud for shared docs</a:t>
+            </a:r>
+            <a:br/>
+            <a:r>
+              <a:rPr/>
+              <a:t>- RStudio workflows in progress</a:t>
+            </a:r>
+          </a:p>
+          <a:p>
+            <a:pPr lvl="0" indent="0" marL="0">
+              <a:buNone/>
+            </a:pPr>
+            <a:r>
+              <a:rPr/>
+              <a:t>📚 Education &amp; Workshops:</a:t>
+            </a:r>
+            <a:br/>
+            <a:r>
+              <a:rPr/>
+              <a:t>- AI workshops based on real failures</a:t>
+            </a:r>
+            <a:br/>
+            <a:r>
+              <a:rPr/>
+              <a:t>- Mentoring students with ready-to-use tools</a:t>
+            </a:r>
+            <a:br/>
+            <a:r>
+              <a:rPr/>
+              <a:t>- Focus on prompting over building</a:t>
+            </a:r>
+            <a:br/>
+            <a:r>
+              <a:rPr/>
+              <a:t>- Toward an AI learning track</a:t>
+            </a:r>
+          </a:p>
+        </p:txBody>
+      </p:sp>
+      <p:sp>
+        <p:nvSpPr>
+          <p:cNvPr id="4" name="Content Placeholder 3">
+            <a:extLst>
+              <a:ext uri="{FF2B5EF4-FFF2-40B4-BE49-F238E27FC236}">
+                <a16:creationId xmlns:a16="http://schemas.microsoft.com/office/drawing/2014/main" id="{3B974A49-6A1E-2F48-B419-02B0A17B9692}"/>
+              </a:ext>
+            </a:extLst>
+          </p:cNvPr>
+          <p:cNvSpPr>
+            <a:spLocks noGrp="1"/>
+          </p:cNvSpPr>
+          <p:nvPr>
+            <p:ph idx="2" sz="half"/>
+          </p:nvPr>
+        </p:nvSpPr>
+        <p:spPr/>
+        <p:txBody>
+          <a:bodyPr/>
+          <a:lstStyle/>
+          <a:p>
+            <a:pPr lvl="0" indent="0" marL="0">
+              <a:buNone/>
+            </a:pPr>
+            <a:r>
+              <a:rPr/>
+              <a:t>🌐 R&amp;D:</a:t>
+            </a:r>
+            <a:br/>
+            <a:r>
+              <a:rPr/>
+              <a:t>- Tool testing (Far.AI, AI Scientist)</a:t>
+            </a:r>
+            <a:br/>
+            <a:r>
+              <a:rPr/>
+              <a:t>- R-based reproducibility pilots</a:t>
+            </a:r>
+            <a:br/>
+            <a:r>
+              <a:rPr/>
+              <a:t>- Mapping AI for research workflows</a:t>
+            </a:r>
+          </a:p>
+          <a:p>
+            <a:pPr lvl="0" indent="0" marL="0">
+              <a:buNone/>
+            </a:pPr>
+            <a:r>
+              <a:rPr/>
+              <a:t>🤝 Collaborations:</a:t>
+            </a:r>
+            <a:br/>
+            <a:r>
+              <a:rPr/>
+              <a:t>- AgUnity (Clearroots) Stefan</a:t>
+            </a:r>
+            <a:br/>
+            <a:r>
+              <a:rPr/>
+              <a:t>- Thomas Mazuiri (VCH-Infra), - Torsten Raudssus (Supplylens), Thomas Dik - SCF NICE (grant/pilot) Luka Westergeest</a:t>
             </a:r>
           </a:p>
         </p:txBody>
@@ -6242,7 +7497,7 @@
           <p:cNvPr id="2" name="Title 1">
             <a:extLst>
               <a:ext uri="{FF2B5EF4-FFF2-40B4-BE49-F238E27FC236}">
-                <a16:creationId xmlns:a16="http://schemas.microsoft.com/office/drawing/2014/main" id="{DD9B8E45-0772-954C-8D4B-6E6808DFEDED}"/>
+                <a16:creationId xmlns:a16="http://schemas.microsoft.com/office/drawing/2014/main" id="{2ECFDBC1-527D-3041-984A-EF5E7E9B7495}"/>
               </a:ext>
             </a:extLst>
           </p:cNvPr>
@@ -6281,15 +7536,15 @@
           <p:cNvPr id="3" name="Content Placeholder 2">
             <a:extLst>
               <a:ext uri="{FF2B5EF4-FFF2-40B4-BE49-F238E27FC236}">
-                <a16:creationId xmlns:a16="http://schemas.microsoft.com/office/drawing/2014/main" id="{A4EB24F9-04F1-C843-9D71-56C5C024552B}"/>
-              </a:ext>
-            </a:extLst>
-          </p:cNvPr>
-          <p:cNvSpPr>
-            <a:spLocks noGrp="1"/>
-          </p:cNvSpPr>
-          <p:nvPr>
-            <p:ph idx="1"/>
+                <a16:creationId xmlns:a16="http://schemas.microsoft.com/office/drawing/2014/main" id="{63FA7BF1-44B1-744C-AB68-4BB0A6A5977E}"/>
+              </a:ext>
+            </a:extLst>
+          </p:cNvPr>
+          <p:cNvSpPr>
+            <a:spLocks noGrp="1"/>
+          </p:cNvSpPr>
+          <p:nvPr>
+            <p:ph idx="1" sz="half"/>
           </p:nvPr>
         </p:nvSpPr>
         <p:spPr/>
@@ -6302,87 +7557,197 @@
             </a:pPr>
             <a:r>
               <a:rPr/>
-              <a:t>Goal: Enable students to use local LLMs for assignments, feedback, and learning.</a:t>
-            </a:r>
-          </a:p>
-          <a:p>
-            <a:pPr lvl="0" indent="0" marL="0">
-              <a:buNone/>
-            </a:pPr>
-            <a:r>
-              <a:rPr/>
-              <a:t>Why: A local LLM stack lets students perform advanced supply chain research securely and independently, using real data without relying on external cloud services.</a:t>
-            </a:r>
-          </a:p>
-          <a:p>
-            <a:pPr lvl="0" indent="0" marL="0">
-              <a:buNone/>
-            </a:pPr>
-            <a:r>
-              <a:rPr/>
-              <a:t>Accomplished: - Fully running OpenWebUI-based LLM environment</a:t>
+              <a:t>🎯 Goal:</a:t>
             </a:r>
             <a:br/>
             <a:r>
               <a:rPr/>
-              <a:t>- Hosted on our own local-controlled server</a:t>
+              <a:t>Enable students to use local LLMs for assignments, feedback, and learning.</a:t>
+            </a:r>
+          </a:p>
+          <a:p>
+            <a:pPr lvl="0" indent="0" marL="0">
+              <a:buNone/>
+            </a:pPr>
+            <a:r>
+              <a:rPr/>
+              <a:t>🔒 Why:</a:t>
             </a:r>
             <a:br/>
             <a:r>
               <a:rPr/>
-              <a:t>- Integrated tools: Qdrant, n8n, pgvector, dashboards</a:t>
-            </a:r>
-          </a:p>
-          <a:p>
-            <a:pPr lvl="0" indent="0" marL="0">
-              <a:buNone/>
-            </a:pPr>
-            <a:r>
-              <a:rPr/>
-              <a:t>Now Possible: We can create automated flows with memory.</a:t>
-            </a:r>
-          </a:p>
-          <a:p>
-            <a:pPr lvl="0" indent="0" marL="0">
-              <a:buNone/>
-            </a:pPr>
-            <a:r>
-              <a:rPr/>
-              <a:t>Next Steps: - Broader student adoption</a:t>
-            </a:r>
-            <a:br/>
-            <a:r>
-              <a:rPr/>
-              <a:t>- Classroom integration</a:t>
-            </a:r>
-            <a:br/>
-            <a:r>
-              <a:rPr/>
-              <a:t>- Develop real use cases</a:t>
-            </a:r>
-          </a:p>
-          <a:p>
-            <a:pPr lvl="0" indent="0" marL="0">
-              <a:buNone/>
-            </a:pPr>
-            <a:r>
-              <a:rPr/>
-              <a:t>Help Needed: - Budget for TOKENS so we can run large models</a:t>
-            </a:r>
-            <a:br/>
-            <a:r>
-              <a:rPr/>
-              <a:t>- Current costs are being covered personally</a:t>
-            </a:r>
-            <a:br/>
-            <a:r>
-              <a:rPr/>
-              <a:t>- Time allocation is needed to maintain and grow the stack</a:t>
-            </a:r>
-            <a:br/>
-            <a:r>
-              <a:rPr/>
-              <a:t>- Confirmation that this is a supported, strategic direction</a:t>
+              <a:t>A local LLM stack enables:</a:t>
+            </a:r>
+          </a:p>
+          <a:p>
+            <a:pPr lvl="0"/>
+            <a:r>
+              <a:rPr/>
+              <a:t>Secure research with real data</a:t>
+            </a:r>
+          </a:p>
+          <a:p>
+            <a:pPr lvl="0"/>
+            <a:r>
+              <a:rPr/>
+              <a:t>No reliance on cloud services</a:t>
+            </a:r>
+          </a:p>
+          <a:p>
+            <a:pPr lvl="0"/>
+            <a:r>
+              <a:rPr/>
+              <a:t>Independent student experimentation</a:t>
+            </a:r>
+          </a:p>
+          <a:p>
+            <a:pPr lvl="0" indent="0" marL="0">
+              <a:buNone/>
+            </a:pPr>
+            <a:r>
+              <a:rPr/>
+              <a:t>✅ Accomplished:</a:t>
+            </a:r>
+          </a:p>
+          <a:p>
+            <a:pPr lvl="0"/>
+            <a:r>
+              <a:rPr/>
+              <a:t>Running OpenWebUI-based LLM environment</a:t>
+            </a:r>
+          </a:p>
+          <a:p>
+            <a:pPr lvl="0"/>
+            <a:r>
+              <a:rPr/>
+              <a:t>Hosted on a local-controlled server</a:t>
+            </a:r>
+          </a:p>
+          <a:p>
+            <a:pPr lvl="0"/>
+            <a:r>
+              <a:rPr/>
+              <a:t>Integrated tools: Qdrant, n8n, pgvector, dashboards</a:t>
+            </a:r>
+          </a:p>
+          <a:p>
+            <a:pPr lvl="0" indent="0" marL="0">
+              <a:buNone/>
+            </a:pPr>
+            <a:r>
+              <a:rPr/>
+              <a:t>🧠 Now Possible:</a:t>
+            </a:r>
+          </a:p>
+          <a:p>
+            <a:pPr lvl="0"/>
+            <a:r>
+              <a:rPr/>
+              <a:t>Memory-enabled AI workflows</a:t>
+            </a:r>
+          </a:p>
+          <a:p>
+            <a:pPr lvl="0" indent="0" marL="0">
+              <a:buNone/>
+            </a:pPr>
+            <a:r>
+              <a:rPr/>
+              <a:t>More info: - </a:t>
+            </a:r>
+            <a:r>
+              <a:rPr>
+                <a:hlinkClick r:id="rId3"/>
+              </a:rPr>
+              <a:t>VCH-Infra</a:t>
+            </a:r>
+          </a:p>
+        </p:txBody>
+      </p:sp>
+      <p:sp>
+        <p:nvSpPr>
+          <p:cNvPr id="4" name="Content Placeholder 3">
+            <a:extLst>
+              <a:ext uri="{FF2B5EF4-FFF2-40B4-BE49-F238E27FC236}">
+                <a16:creationId xmlns:a16="http://schemas.microsoft.com/office/drawing/2014/main" id="{3B974A49-6A1E-2F48-B419-02B0A17B9692}"/>
+              </a:ext>
+            </a:extLst>
+          </p:cNvPr>
+          <p:cNvSpPr>
+            <a:spLocks noGrp="1"/>
+          </p:cNvSpPr>
+          <p:nvPr>
+            <p:ph idx="2" sz="half"/>
+          </p:nvPr>
+        </p:nvSpPr>
+        <p:spPr/>
+        <p:txBody>
+          <a:bodyPr/>
+          <a:lstStyle/>
+          <a:p>
+            <a:pPr lvl="0" indent="0" marL="0">
+              <a:buNone/>
+            </a:pPr>
+            <a:r>
+              <a:rPr/>
+              <a:t>🚀 Next Steps:</a:t>
+            </a:r>
+          </a:p>
+          <a:p>
+            <a:pPr lvl="0"/>
+            <a:r>
+              <a:rPr/>
+              <a:t>Broader student adoption</a:t>
+            </a:r>
+          </a:p>
+          <a:p>
+            <a:pPr lvl="0"/>
+            <a:r>
+              <a:rPr/>
+              <a:t>Classroom integration</a:t>
+            </a:r>
+          </a:p>
+          <a:p>
+            <a:pPr lvl="0"/>
+            <a:r>
+              <a:rPr/>
+              <a:t>Real use case development</a:t>
+            </a:r>
+          </a:p>
+          <a:p>
+            <a:pPr lvl="0" indent="0" marL="0">
+              <a:buNone/>
+            </a:pPr>
+            <a:r>
+              <a:rPr/>
+              <a:t>🆘 Help Needed:</a:t>
+            </a:r>
+          </a:p>
+          <a:p>
+            <a:pPr lvl="0"/>
+            <a:r>
+              <a:rPr/>
+              <a:t>Budget for TOKENS to run larger models</a:t>
+            </a:r>
+          </a:p>
+          <a:p>
+            <a:pPr lvl="0"/>
+            <a:r>
+              <a:rPr/>
+              <a:t>Personal costs are unsustainable</a:t>
+            </a:r>
+          </a:p>
+          <a:p>
+            <a:pPr lvl="0"/>
+            <a:r>
+              <a:rPr/>
+              <a:t>Need focused hours to maintain and improve</a:t>
+            </a:r>
+          </a:p>
+          <a:p>
+            <a:pPr lvl="0"/>
+            <a:r>
+              <a:rPr/>
+              <a:t>Requesting support and validation of direction</a:t>
             </a:r>
           </a:p>
         </p:txBody>
@@ -6414,7 +7779,7 @@
           <p:cNvPr id="2" name="Title 1">
             <a:extLst>
               <a:ext uri="{FF2B5EF4-FFF2-40B4-BE49-F238E27FC236}">
-                <a16:creationId xmlns:a16="http://schemas.microsoft.com/office/drawing/2014/main" id="{DD9B8E45-0772-954C-8D4B-6E6808DFEDED}"/>
+                <a16:creationId xmlns:a16="http://schemas.microsoft.com/office/drawing/2014/main" id="{2ECFDBC1-527D-3041-984A-EF5E7E9B7495}"/>
               </a:ext>
             </a:extLst>
           </p:cNvPr>
@@ -6453,15 +7818,15 @@
           <p:cNvPr id="3" name="Content Placeholder 2">
             <a:extLst>
               <a:ext uri="{FF2B5EF4-FFF2-40B4-BE49-F238E27FC236}">
-                <a16:creationId xmlns:a16="http://schemas.microsoft.com/office/drawing/2014/main" id="{A4EB24F9-04F1-C843-9D71-56C5C024552B}"/>
-              </a:ext>
-            </a:extLst>
-          </p:cNvPr>
-          <p:cNvSpPr>
-            <a:spLocks noGrp="1"/>
-          </p:cNvSpPr>
-          <p:nvPr>
-            <p:ph idx="1"/>
+                <a16:creationId xmlns:a16="http://schemas.microsoft.com/office/drawing/2014/main" id="{63FA7BF1-44B1-744C-AB68-4BB0A6A5977E}"/>
+              </a:ext>
+            </a:extLst>
+          </p:cNvPr>
+          <p:cNvSpPr>
+            <a:spLocks noGrp="1"/>
+          </p:cNvSpPr>
+          <p:nvPr>
+            <p:ph idx="1" sz="half"/>
           </p:nvPr>
         </p:nvSpPr>
         <p:spPr/>
@@ -6474,86 +7839,136 @@
             </a:pPr>
             <a:r>
               <a:rPr/>
-              <a:t>Goal: Provide infrastructure with built-in tools so students can quickly ideate and prototype.</a:t>
-            </a:r>
-          </a:p>
-          <a:p>
-            <a:pPr lvl="0" indent="0" marL="0">
-              <a:buNone/>
-            </a:pPr>
-            <a:r>
-              <a:rPr/>
-              <a:t>Why: A seamless environment helps students move from ideas to experiments without technical barriers.</a:t>
-            </a:r>
-          </a:p>
-          <a:p>
-            <a:pPr lvl="0" indent="0" marL="0">
-              <a:buNone/>
-            </a:pPr>
-            <a:r>
-              <a:rPr/>
-              <a:t>Accomplished: - AI stack fully deployed</a:t>
+              <a:t>🎯 Goal:</a:t>
             </a:r>
             <a:br/>
             <a:r>
               <a:rPr/>
-              <a:t>- Nextcloud environment live</a:t>
+              <a:t>Provide infrastructure with built-in tools so students can quickly ideate and prototype.</a:t>
+            </a:r>
+          </a:p>
+          <a:p>
+            <a:pPr lvl="0" indent="0" marL="0">
+              <a:buNone/>
+            </a:pPr>
+            <a:r>
+              <a:rPr/>
+              <a:t>⚙️ Why:</a:t>
             </a:r>
             <a:br/>
             <a:r>
               <a:rPr/>
-              <a:t>- DAT Linux system in full testing</a:t>
-            </a:r>
-          </a:p>
-          <a:p>
-            <a:pPr lvl="0" indent="0" marL="0">
-              <a:buNone/>
-            </a:pPr>
-            <a:r>
-              <a:rPr/>
-              <a:t>Next Steps: - Integrate AI tools more tightly with the DAT Linux OS</a:t>
-            </a:r>
-            <a:br/>
-            <a:r>
-              <a:rPr/>
-              <a:t>- Enable AI-enhanced features inside Nextcloud</a:t>
-            </a:r>
-            <a:br/>
-            <a:r>
-              <a:rPr/>
-              <a:t>- Launch a Nextcloud-based documentation server</a:t>
-            </a:r>
-          </a:p>
-          <a:p>
-            <a:pPr lvl="0" indent="0" marL="0">
-              <a:buNone/>
-            </a:pPr>
-            <a:r>
-              <a:rPr/>
-              <a:t>Help Needed: - Hands-on testing of all tools and automations</a:t>
-            </a:r>
-            <a:br/>
-            <a:r>
-              <a:rPr/>
-              <a:t>- Feedback on what’s missing or broken</a:t>
-            </a:r>
-            <a:br/>
-            <a:r>
-              <a:rPr/>
-              <a:t>- I need </a:t>
-            </a:r>
-            <a:r>
-              <a:rPr i="1"/>
-              <a:t>hours</a:t>
-            </a:r>
-            <a:r>
-              <a:rPr/>
-              <a:t> to improve reliability</a:t>
-            </a:r>
-            <a:br/>
-            <a:r>
-              <a:rPr/>
-              <a:t>- I need support to validate that this infrastructure path makes sense</a:t>
+              <a:t>A seamless environment helps students move from ideas to experiments without technical barriers. ✅ Accomplished:</a:t>
+            </a:r>
+          </a:p>
+          <a:p>
+            <a:pPr lvl="0"/>
+            <a:r>
+              <a:rPr/>
+              <a:t>AI stack fully deployed</a:t>
+            </a:r>
+          </a:p>
+          <a:p>
+            <a:pPr lvl="0"/>
+            <a:r>
+              <a:rPr/>
+              <a:t>Nextcloud environment live</a:t>
+            </a:r>
+          </a:p>
+          <a:p>
+            <a:pPr lvl="0"/>
+            <a:r>
+              <a:rPr/>
+              <a:t>DAT Linux system in full testing</a:t>
+            </a:r>
+          </a:p>
+        </p:txBody>
+      </p:sp>
+      <p:sp>
+        <p:nvSpPr>
+          <p:cNvPr id="4" name="Content Placeholder 3">
+            <a:extLst>
+              <a:ext uri="{FF2B5EF4-FFF2-40B4-BE49-F238E27FC236}">
+                <a16:creationId xmlns:a16="http://schemas.microsoft.com/office/drawing/2014/main" id="{3B974A49-6A1E-2F48-B419-02B0A17B9692}"/>
+              </a:ext>
+            </a:extLst>
+          </p:cNvPr>
+          <p:cNvSpPr>
+            <a:spLocks noGrp="1"/>
+          </p:cNvSpPr>
+          <p:nvPr>
+            <p:ph idx="2" sz="half"/>
+          </p:nvPr>
+        </p:nvSpPr>
+        <p:spPr/>
+        <p:txBody>
+          <a:bodyPr/>
+          <a:lstStyle/>
+          <a:p>
+            <a:pPr lvl="0" indent="0" marL="0">
+              <a:buNone/>
+            </a:pPr>
+            <a:r>
+              <a:rPr/>
+              <a:t>🚀 Next Steps:</a:t>
+            </a:r>
+          </a:p>
+          <a:p>
+            <a:pPr lvl="0"/>
+            <a:r>
+              <a:rPr/>
+              <a:t>Tighter integration of AI tools with DAT Linux</a:t>
+            </a:r>
+          </a:p>
+          <a:p>
+            <a:pPr lvl="0"/>
+            <a:r>
+              <a:rPr/>
+              <a:t>Enable AI features inside Nextcloud</a:t>
+            </a:r>
+          </a:p>
+          <a:p>
+            <a:pPr lvl="0"/>
+            <a:r>
+              <a:rPr/>
+              <a:t>Launch a documentation server using Nextcloud</a:t>
+            </a:r>
+          </a:p>
+          <a:p>
+            <a:pPr lvl="0" indent="0" marL="0">
+              <a:buNone/>
+            </a:pPr>
+            <a:r>
+              <a:rPr/>
+              <a:t>🆘 Help Needed:</a:t>
+            </a:r>
+          </a:p>
+          <a:p>
+            <a:pPr lvl="0"/>
+            <a:r>
+              <a:rPr/>
+              <a:t>Hands-on testing of tools and flows</a:t>
+            </a:r>
+          </a:p>
+          <a:p>
+            <a:pPr lvl="0"/>
+            <a:r>
+              <a:rPr/>
+              <a:t>Feedback on missing functionality</a:t>
+            </a:r>
+          </a:p>
+          <a:p>
+            <a:pPr lvl="0"/>
+            <a:r>
+              <a:rPr/>
+              <a:t>Time to improve reliability</a:t>
+            </a:r>
+          </a:p>
+          <a:p>
+            <a:pPr lvl="0"/>
+            <a:r>
+              <a:rPr/>
+              <a:t>Support to validate that this is the right direction</a:t>
             </a:r>
           </a:p>
         </p:txBody>
@@ -6585,7 +8000,7 @@
           <p:cNvPr id="2" name="Title 1">
             <a:extLst>
               <a:ext uri="{FF2B5EF4-FFF2-40B4-BE49-F238E27FC236}">
-                <a16:creationId xmlns:a16="http://schemas.microsoft.com/office/drawing/2014/main" id="{DD9B8E45-0772-954C-8D4B-6E6808DFEDED}"/>
+                <a16:creationId xmlns:a16="http://schemas.microsoft.com/office/drawing/2014/main" id="{2ECFDBC1-527D-3041-984A-EF5E7E9B7495}"/>
               </a:ext>
             </a:extLst>
           </p:cNvPr>
@@ -6624,15 +8039,15 @@
           <p:cNvPr id="3" name="Content Placeholder 2">
             <a:extLst>
               <a:ext uri="{FF2B5EF4-FFF2-40B4-BE49-F238E27FC236}">
-                <a16:creationId xmlns:a16="http://schemas.microsoft.com/office/drawing/2014/main" id="{A4EB24F9-04F1-C843-9D71-56C5C024552B}"/>
-              </a:ext>
-            </a:extLst>
-          </p:cNvPr>
-          <p:cNvSpPr>
-            <a:spLocks noGrp="1"/>
-          </p:cNvSpPr>
-          <p:nvPr>
-            <p:ph idx="1"/>
+                <a16:creationId xmlns:a16="http://schemas.microsoft.com/office/drawing/2014/main" id="{63FA7BF1-44B1-744C-AB68-4BB0A6A5977E}"/>
+              </a:ext>
+            </a:extLst>
+          </p:cNvPr>
+          <p:cNvSpPr>
+            <a:spLocks noGrp="1"/>
+          </p:cNvSpPr>
+          <p:nvPr>
+            <p:ph idx="1" sz="half"/>
           </p:nvPr>
         </p:nvSpPr>
         <p:spPr/>
@@ -6645,91 +8060,145 @@
             </a:pPr>
             <a:r>
               <a:rPr/>
-              <a:t>Goal: Enable researchers to build, test, and share repeatable experiments — including data, code, and results.</a:t>
-            </a:r>
-          </a:p>
-          <a:p>
-            <a:pPr lvl="0" indent="0" marL="0">
-              <a:buNone/>
-            </a:pPr>
-            <a:r>
-              <a:rPr/>
-              <a:t>Why: This supports frictionless academic collaboration:</a:t>
+              <a:t>🎯 Goal:</a:t>
             </a:r>
             <a:br/>
             <a:r>
               <a:rPr/>
-              <a:t>- Reproduce prior research</a:t>
+              <a:t>Enable researchers to build, test, and share repeatable experiments — including data, code, and results.</a:t>
+            </a:r>
+          </a:p>
+          <a:p>
+            <a:pPr lvl="0" indent="0" marL="0">
+              <a:buNone/>
+            </a:pPr>
+            <a:r>
+              <a:rPr/>
+              <a:t>🔍 Why:</a:t>
+            </a:r>
+          </a:p>
+          <a:p>
+            <a:pPr lvl="0"/>
+            <a:r>
+              <a:rPr/>
+              <a:t>Reproduce prior research</a:t>
+            </a:r>
+          </a:p>
+          <a:p>
+            <a:pPr lvl="0"/>
+            <a:r>
+              <a:rPr/>
+              <a:t>Run simulations</a:t>
+            </a:r>
+          </a:p>
+          <a:p>
+            <a:pPr lvl="0"/>
+            <a:r>
+              <a:rPr/>
+              <a:t>Build openly on others’ work</a:t>
             </a:r>
             <a:br/>
             <a:r>
               <a:rPr/>
-              <a:t>- Run simulations</a:t>
-            </a:r>
-            <a:br/>
-            <a:r>
-              <a:rPr/>
-              <a:t>- Build openly on each other’s work</a:t>
-            </a:r>
-            <a:br/>
-            <a:r>
-              <a:rPr/>
-              <a:t>AI has narrow, specific uses in research — but reproducibility unlocks real value.</a:t>
-            </a:r>
-          </a:p>
-          <a:p>
-            <a:pPr lvl="0" indent="0" marL="0">
-              <a:buNone/>
-            </a:pPr>
-            <a:r>
-              <a:rPr/>
-              <a:t>Accomplished: - Full stack is deployable using DAT Linux, Docker, and systemd</a:t>
-            </a:r>
-            <a:br/>
-            <a:r>
-              <a:rPr/>
-              <a:t>- RStudio Server tested and running</a:t>
-            </a:r>
-          </a:p>
-          <a:p>
-            <a:pPr lvl="0" indent="0" marL="0">
-              <a:buNone/>
-            </a:pPr>
-            <a:r>
-              <a:rPr/>
-              <a:t>Next Steps: - Develop integrated research workflows in RStudio</a:t>
-            </a:r>
-            <a:br/>
-            <a:r>
-              <a:rPr/>
-              <a:t>- Study and apply data stewardship best practices</a:t>
-            </a:r>
-          </a:p>
-          <a:p>
-            <a:pPr lvl="0" indent="0" marL="0">
-              <a:buNone/>
-            </a:pPr>
-            <a:r>
-              <a:rPr/>
-              <a:t>Help Needed: - I need a real past research project to rebuild as a reproducible R workflow</a:t>
-            </a:r>
-            <a:br/>
-            <a:r>
-              <a:rPr/>
-              <a:t>- I need </a:t>
-            </a:r>
-            <a:r>
-              <a:rPr i="1"/>
-              <a:t>hours</a:t>
-            </a:r>
-            <a:r>
-              <a:rPr/>
-              <a:t> to prototype and document it properly</a:t>
-            </a:r>
-            <a:br/>
-            <a:r>
-              <a:rPr/>
-              <a:t>- I need confirmation that this direction aligns with our goals</a:t>
+              <a:t>AI is most useful in research when workflows are reproducible and verifiable.</a:t>
+            </a:r>
+          </a:p>
+          <a:p>
+            <a:pPr lvl="0" indent="0" marL="0">
+              <a:buNone/>
+            </a:pPr>
+            <a:r>
+              <a:rPr/>
+              <a:t>✅ Accomplished:</a:t>
+            </a:r>
+          </a:p>
+          <a:p>
+            <a:pPr lvl="0"/>
+            <a:r>
+              <a:rPr/>
+              <a:t>Stack deployable with DAT Linux, Docker, systemd</a:t>
+            </a:r>
+          </a:p>
+          <a:p>
+            <a:pPr lvl="0"/>
+            <a:r>
+              <a:rPr/>
+              <a:t>RStudio Server tested and operational</a:t>
+            </a:r>
+          </a:p>
+        </p:txBody>
+      </p:sp>
+      <p:sp>
+        <p:nvSpPr>
+          <p:cNvPr id="4" name="Content Placeholder 3">
+            <a:extLst>
+              <a:ext uri="{FF2B5EF4-FFF2-40B4-BE49-F238E27FC236}">
+                <a16:creationId xmlns:a16="http://schemas.microsoft.com/office/drawing/2014/main" id="{3B974A49-6A1E-2F48-B419-02B0A17B9692}"/>
+              </a:ext>
+            </a:extLst>
+          </p:cNvPr>
+          <p:cNvSpPr>
+            <a:spLocks noGrp="1"/>
+          </p:cNvSpPr>
+          <p:nvPr>
+            <p:ph idx="2" sz="half"/>
+          </p:nvPr>
+        </p:nvSpPr>
+        <p:spPr/>
+        <p:txBody>
+          <a:bodyPr/>
+          <a:lstStyle/>
+          <a:p>
+            <a:pPr lvl="0" indent="0" marL="0">
+              <a:buNone/>
+            </a:pPr>
+            <a:r>
+              <a:rPr/>
+              <a:t>🚀 Next Steps:</a:t>
+            </a:r>
+          </a:p>
+          <a:p>
+            <a:pPr lvl="0"/>
+            <a:r>
+              <a:rPr/>
+              <a:t>Develop integrated workflows with RStudio</a:t>
+            </a:r>
+          </a:p>
+          <a:p>
+            <a:pPr lvl="0"/>
+            <a:r>
+              <a:rPr/>
+              <a:t>Learn and apply data stewardship practices</a:t>
+            </a:r>
+          </a:p>
+          <a:p>
+            <a:pPr lvl="0" indent="0" marL="0">
+              <a:buNone/>
+            </a:pPr>
+            <a:r>
+              <a:rPr/>
+              <a:t>🆘 Help Needed:</a:t>
+            </a:r>
+          </a:p>
+          <a:p>
+            <a:pPr lvl="0"/>
+            <a:r>
+              <a:rPr/>
+              <a:t>A real past project to rebuild and reproduce in R</a:t>
+            </a:r>
+          </a:p>
+          <a:p>
+            <a:pPr lvl="0"/>
+            <a:r>
+              <a:rPr/>
+              <a:t>Time to prototype and document workflows</a:t>
+            </a:r>
+          </a:p>
+          <a:p>
+            <a:pPr lvl="0"/>
+            <a:r>
+              <a:rPr/>
+              <a:t>Support to ensure this path aligns with our research goals</a:t>
             </a:r>
           </a:p>
         </p:txBody>
@@ -6758,45 +8227,6 @@
       </p:grpSpPr>
       <p:sp>
         <p:nvSpPr>
-          <p:cNvPr id="2" name="Title 1">
-            <a:extLst>
-              <a:ext uri="{FF2B5EF4-FFF2-40B4-BE49-F238E27FC236}">
-                <a16:creationId xmlns:a16="http://schemas.microsoft.com/office/drawing/2014/main" id="{DD9B8E45-0772-954C-8D4B-6E6808DFEDED}"/>
-              </a:ext>
-            </a:extLst>
-          </p:cNvPr>
-          <p:cNvSpPr>
-            <a:spLocks noGrp="1"/>
-          </p:cNvSpPr>
-          <p:nvPr>
-            <p:ph type="title"/>
-          </p:nvPr>
-        </p:nvSpPr>
-        <p:spPr>
-          <a:xfrm>
-            <a:off x="838200" y="365129"/>
-            <a:ext cx="10515600" cy="1325563"/>
-          </a:xfrm>
-          <a:prstGeom prst="rect">
-            <a:avLst/>
-          </a:prstGeom>
-        </p:spPr>
-        <p:txBody>
-          <a:bodyPr/>
-          <a:lstStyle/>
-          <a:p>
-            <a:pPr lvl="0" indent="0" marL="0">
-              <a:buNone/>
-            </a:pPr>
-            <a:r>
-              <a:rPr/>
-              <a:t>4. Practical AI Use Cases &amp; Workshops</a:t>
-            </a:r>
-          </a:p>
-        </p:txBody>
-      </p:sp>
-      <p:sp>
-        <p:nvSpPr>
           <p:cNvPr id="3" name="Content Placeholder 2">
             <a:extLst>
               <a:ext uri="{FF2B5EF4-FFF2-40B4-BE49-F238E27FC236}">
@@ -6821,93 +8251,13 @@
             </a:pPr>
             <a:r>
               <a:rPr/>
-              <a:t>Goal: Teach students how to use AI tools effectively, with a focus on real-world limitations.</a:t>
-            </a:r>
-          </a:p>
-          <a:p>
-            <a:pPr lvl="0" indent="0" marL="0">
-              <a:buNone/>
-            </a:pPr>
-            <a:r>
-              <a:rPr/>
-              <a:t>Why:</a:t>
-            </a:r>
-            <a:br/>
-            <a:r>
-              <a:rPr/>
-              <a:t>AI is massively overhyped. In reality: - It makes frequent mistakes</a:t>
-            </a:r>
-            <a:br/>
-            <a:r>
-              <a:rPr/>
-              <a:t>- Lacks reasoning and context awareness</a:t>
-            </a:r>
-            <a:br/>
-            <a:r>
-              <a:rPr/>
-              <a:t>- Struggles with memory, coherence, and truthfulness</a:t>
-            </a:r>
-            <a:br/>
-            <a:r>
-              <a:rPr/>
-              <a:t>Students must understand how to test, verify, and contain AI — not blindly trust it.</a:t>
-            </a:r>
-          </a:p>
-          <a:p>
-            <a:pPr lvl="0" indent="0" marL="0">
-              <a:buNone/>
-            </a:pPr>
-            <a:r>
-              <a:rPr/>
-              <a:t>Accomplished: - Workshop repository created</a:t>
-            </a:r>
-            <a:br/>
-            <a:r>
-              <a:rPr/>
-              <a:t>- First sessions completed</a:t>
-            </a:r>
-            <a:br/>
-            <a:r>
-              <a:rPr/>
-              <a:t>- Practical failures (e.g. Knopenkoning, Inchainge) revealed major AI limitations</a:t>
-            </a:r>
-          </a:p>
-          <a:p>
-            <a:pPr lvl="0" indent="0" marL="0">
-              <a:buNone/>
-            </a:pPr>
-            <a:r>
-              <a:rPr/>
-              <a:t>Next Steps: - Translate IBM-based workshop into applied, real-world format</a:t>
-            </a:r>
-            <a:br/>
-            <a:r>
-              <a:rPr/>
-              <a:t>- Teach data translation: from models to operational reality</a:t>
-            </a:r>
-            <a:br/>
-            <a:r>
-              <a:rPr/>
-              <a:t>- Embed these lessons into ongoing workshop series</a:t>
-            </a:r>
-          </a:p>
-          <a:p>
-            <a:pPr lvl="0" indent="0" marL="0">
-              <a:buNone/>
-            </a:pPr>
-            <a:r>
-              <a:rPr/>
-              <a:t>Help Needed: - Manpower: integration engineers, network engineers, workshop co-builders</a:t>
-            </a:r>
-            <a:br/>
-            <a:r>
-              <a:rPr/>
-              <a:t>- Testers to challenge tools and give feedback</a:t>
-            </a:r>
-            <a:br/>
-            <a:r>
-              <a:rPr/>
-              <a:t>- Regular, scheduled workshops and hands-on AI meetups</a:t>
+              <a:t>More info: - </a:t>
+            </a:r>
+            <a:r>
+              <a:rPr>
+                <a:hlinkClick r:id="rId2"/>
+              </a:rPr>
+              <a:t>VCH-Infra</a:t>
             </a:r>
           </a:p>
         </p:txBody>
@@ -6939,7 +8289,7 @@
           <p:cNvPr id="2" name="Title 1">
             <a:extLst>
               <a:ext uri="{FF2B5EF4-FFF2-40B4-BE49-F238E27FC236}">
-                <a16:creationId xmlns:a16="http://schemas.microsoft.com/office/drawing/2014/main" id="{DD9B8E45-0772-954C-8D4B-6E6808DFEDED}"/>
+                <a16:creationId xmlns:a16="http://schemas.microsoft.com/office/drawing/2014/main" id="{2ECFDBC1-527D-3041-984A-EF5E7E9B7495}"/>
               </a:ext>
             </a:extLst>
           </p:cNvPr>
@@ -6968,7 +8318,7 @@
             </a:pPr>
             <a:r>
               <a:rPr/>
-              <a:t>5. AI-Supported Student Projects</a:t>
+              <a:t>4. Practical AI Use Cases &amp; Workshops</a:t>
             </a:r>
           </a:p>
         </p:txBody>
@@ -6978,15 +8328,15 @@
           <p:cNvPr id="3" name="Content Placeholder 2">
             <a:extLst>
               <a:ext uri="{FF2B5EF4-FFF2-40B4-BE49-F238E27FC236}">
-                <a16:creationId xmlns:a16="http://schemas.microsoft.com/office/drawing/2014/main" id="{A4EB24F9-04F1-C843-9D71-56C5C024552B}"/>
-              </a:ext>
-            </a:extLst>
-          </p:cNvPr>
-          <p:cNvSpPr>
-            <a:spLocks noGrp="1"/>
-          </p:cNvSpPr>
-          <p:nvPr>
-            <p:ph idx="1"/>
+                <a16:creationId xmlns:a16="http://schemas.microsoft.com/office/drawing/2014/main" id="{63FA7BF1-44B1-744C-AB68-4BB0A6A5977E}"/>
+              </a:ext>
+            </a:extLst>
+          </p:cNvPr>
+          <p:cNvSpPr>
+            <a:spLocks noGrp="1"/>
+          </p:cNvSpPr>
+          <p:nvPr>
+            <p:ph idx="1" sz="half"/>
           </p:nvPr>
         </p:nvSpPr>
         <p:spPr/>
@@ -6999,156 +8349,171 @@
             </a:pPr>
             <a:r>
               <a:rPr/>
-              <a:t>Goal: Support student-led projects by giving them access to AI tools that just work — instead of expecting them to build or understand AI infrastructure from scratch.</a:t>
-            </a:r>
-          </a:p>
-          <a:p>
-            <a:pPr lvl="0" indent="0" marL="0">
-              <a:buNone/>
-            </a:pPr>
-            <a:r>
-              <a:rPr/>
-              <a:t>Why:</a:t>
+              <a:t>🎯 Goal:</a:t>
             </a:r>
             <a:br/>
             <a:r>
               <a:rPr/>
-              <a:t>As Maxime correctly pointed out, most students are not equipped to build models or flows.</a:t>
+              <a:t>Teach students how to use AI tools effectively — with a clear understanding of their limitations.</a:t>
+            </a:r>
+          </a:p>
+          <a:p>
+            <a:pPr lvl="0" indent="0" marL="0">
+              <a:buNone/>
+            </a:pPr>
+            <a:r>
+              <a:rPr/>
+              <a:t>⚠️ Why:</a:t>
             </a:r>
             <a:br/>
             <a:r>
               <a:rPr/>
-              <a:t>Chris worked with “What he had and what he was working with”, but that doesnt work; Instead, we: - Provide working - End-user faceing tools; not chatbots. - Focus on prompting, saving, processing</a:t>
+              <a:t>AI is overhyped. In practice:</a:t>
+            </a:r>
+          </a:p>
+          <a:p>
+            <a:pPr lvl="0"/>
+            <a:r>
+              <a:rPr/>
+              <a:t>It makes mistakes</a:t>
+            </a:r>
+          </a:p>
+          <a:p>
+            <a:pPr lvl="0"/>
+            <a:r>
+              <a:rPr/>
+              <a:t>Lacks reasoning and contextual awareness</a:t>
+            </a:r>
+          </a:p>
+          <a:p>
+            <a:pPr lvl="0"/>
+            <a:r>
+              <a:rPr/>
+              <a:t>Struggles with memory and coherence</a:t>
             </a:r>
             <a:br/>
             <a:r>
               <a:rPr/>
-              <a:t>- Teach integration with commercial and internal systems</a:t>
-            </a:r>
-            <a:br/>
-            <a:r>
-              <a:rPr/>
-              <a:t>This approach boosts their real output — it’s more valuable than sandbox experiments.</a:t>
-            </a:r>
-          </a:p>
-          <a:p>
-            <a:pPr lvl="0" indent="0" marL="0">
-              <a:buNone/>
-            </a:pPr>
-            <a:r>
-              <a:rPr/>
-              <a:t>Accomplished: - Built 2 fully working websites and concepts using AI</a:t>
-            </a:r>
-            <a:br/>
-            <a:r>
-              <a:rPr/>
-              <a:t>- Far beyond what students could build on their own</a:t>
-            </a:r>
-            <a:br/>
-            <a:r>
-              <a:rPr/>
-              <a:t>- Proved that AI mentorship unlocks creativity and output</a:t>
-            </a:r>
-          </a:p>
-          <a:p>
-            <a:pPr lvl="0" indent="0" marL="0">
-              <a:buNone/>
-            </a:pPr>
-            <a:r>
-              <a:rPr/>
-              <a:t>Next Steps: - Showcase project results</a:t>
-            </a:r>
-            <a:br/>
-            <a:r>
-              <a:rPr/>
-              <a:t>- Formalize AI mentorship offerings</a:t>
-            </a:r>
-            <a:br/>
-            <a:r>
-              <a:rPr/>
-              <a:t>- Identify new student use cases</a:t>
-            </a:r>
-          </a:p>
-          <a:p>
-            <a:pPr lvl="0" indent="0" marL="0">
-              <a:buNone/>
-            </a:pPr>
-            <a:r>
-              <a:rPr/>
-              <a:t>Help Needed: - </a:t>
-            </a:r>
-            <a:r>
-              <a:rPr b="1"/>
-              <a:t>Stop</a:t>
-            </a:r>
-            <a:r>
-              <a:rPr/>
-              <a:t> restricting expert-student interactions — students need direct support to accelerate</a:t>
-            </a:r>
-            <a:br/>
-            <a:r>
-              <a:rPr/>
-              <a:t>- </a:t>
-            </a:r>
-            <a:r>
-              <a:rPr b="1"/>
-              <a:t>Start</a:t>
-            </a:r>
-            <a:r>
-              <a:rPr/>
-              <a:t> giving token budgets so we can run large models when needed</a:t>
-            </a:r>
-            <a:br/>
-            <a:r>
-              <a:rPr/>
-              <a:t>- </a:t>
-            </a:r>
-            <a:r>
-              <a:rPr b="1"/>
-              <a:t>Stop</a:t>
-            </a:r>
-            <a:r>
-              <a:rPr/>
-              <a:t> comparing local setups to billion-dollar AI clouds</a:t>
-            </a:r>
-            <a:br/>
-            <a:r>
-              <a:rPr/>
-              <a:t>- </a:t>
-            </a:r>
-            <a:r>
-              <a:rPr b="1"/>
-              <a:t>Start</a:t>
-            </a:r>
-            <a:r>
-              <a:rPr/>
-              <a:t> allowing external experts to connect with our lab (e.g. via Discord or open sessions)</a:t>
-            </a:r>
-            <a:br/>
-            <a:r>
-              <a:rPr/>
-              <a:t>- </a:t>
-            </a:r>
-            <a:r>
-              <a:rPr b="1"/>
-              <a:t>Start</a:t>
-            </a:r>
-            <a:r>
-              <a:rPr/>
-              <a:t> recognizing Value Chain Hackers as a serious initiative: give it a KvK, a domain, and a mandate</a:t>
-            </a:r>
-            <a:br/>
-            <a:r>
-              <a:rPr/>
-              <a:t>- </a:t>
-            </a:r>
-            <a:r>
-              <a:rPr b="1"/>
-              <a:t>Start</a:t>
-            </a:r>
-            <a:r>
-              <a:rPr/>
-              <a:t> giving Chris a dedicated team of IT and business students to build applied AI solutions</a:t>
+              <a:t>Students must learn to test, verify, and control AI systems — not blindly trust them.</a:t>
+            </a:r>
+          </a:p>
+          <a:p>
+            <a:pPr lvl="0" indent="0" marL="0">
+              <a:buNone/>
+            </a:pPr>
+            <a:r>
+              <a:rPr/>
+              <a:t>✅ Accomplished:</a:t>
+            </a:r>
+          </a:p>
+          <a:p>
+            <a:pPr lvl="0"/>
+            <a:r>
+              <a:rPr/>
+              <a:t>Workshop repo created</a:t>
+            </a:r>
+          </a:p>
+          <a:p>
+            <a:pPr lvl="0"/>
+            <a:r>
+              <a:rPr/>
+              <a:t>First sessions delivered</a:t>
+            </a:r>
+          </a:p>
+          <a:p>
+            <a:pPr lvl="0"/>
+            <a:r>
+              <a:rPr/>
+              <a:t>Failures (e.g. Knopenkoning, Inchainge) revealed limitations</a:t>
+            </a:r>
+          </a:p>
+        </p:txBody>
+      </p:sp>
+      <p:sp>
+        <p:nvSpPr>
+          <p:cNvPr id="4" name="Content Placeholder 3">
+            <a:extLst>
+              <a:ext uri="{FF2B5EF4-FFF2-40B4-BE49-F238E27FC236}">
+                <a16:creationId xmlns:a16="http://schemas.microsoft.com/office/drawing/2014/main" id="{3B974A49-6A1E-2F48-B419-02B0A17B9692}"/>
+              </a:ext>
+            </a:extLst>
+          </p:cNvPr>
+          <p:cNvSpPr>
+            <a:spLocks noGrp="1"/>
+          </p:cNvSpPr>
+          <p:nvPr>
+            <p:ph idx="2" sz="half"/>
+          </p:nvPr>
+        </p:nvSpPr>
+        <p:spPr/>
+        <p:txBody>
+          <a:bodyPr/>
+          <a:lstStyle/>
+          <a:p>
+            <a:pPr lvl="0" indent="0" marL="0">
+              <a:buNone/>
+            </a:pPr>
+            <a:r>
+              <a:rPr/>
+              <a:t>🚀 Next Steps:</a:t>
+            </a:r>
+          </a:p>
+          <a:p>
+            <a:pPr lvl="0"/>
+            <a:r>
+              <a:rPr/>
+              <a:t>Translate IBM-based workshop into practical applications</a:t>
+            </a:r>
+          </a:p>
+          <a:p>
+            <a:pPr lvl="0"/>
+            <a:r>
+              <a:rPr/>
+              <a:t>Teach “data-to-reality” thinking</a:t>
+            </a:r>
+          </a:p>
+          <a:p>
+            <a:pPr lvl="0"/>
+            <a:r>
+              <a:rPr/>
+              <a:t>Run an ongoing workshop series with feedback loops</a:t>
+            </a:r>
+          </a:p>
+          <a:p>
+            <a:pPr lvl="0" indent="0" marL="0">
+              <a:buNone/>
+            </a:pPr>
+            <a:r>
+              <a:rPr/>
+              <a:t>🆘 Help Needed:</a:t>
+            </a:r>
+          </a:p>
+          <a:p>
+            <a:pPr lvl="0"/>
+            <a:r>
+              <a:rPr/>
+              <a:t>Integration and network engineers</a:t>
+            </a:r>
+          </a:p>
+          <a:p>
+            <a:pPr lvl="0"/>
+            <a:r>
+              <a:rPr/>
+              <a:t>Students and testers to challenge tools</a:t>
+            </a:r>
+          </a:p>
+          <a:p>
+            <a:pPr lvl="0"/>
+            <a:r>
+              <a:rPr/>
+              <a:t>Regular AI meetups and testing sessions</a:t>
+            </a:r>
+          </a:p>
+          <a:p>
+            <a:pPr lvl="0"/>
+            <a:r>
+              <a:rPr/>
+              <a:t>Hands-on collaborators to co-build use cases</a:t>
             </a:r>
           </a:p>
         </p:txBody>

</xml_diff>